<commit_message>
function beamer power on and backup recorder on off implemented for pre church check
</commit_message>
<xml_diff>
--- a/docu/JoKiAutomationTemplateV1005.pptx
+++ b/docu/JoKiAutomationTemplateV1005.pptx
@@ -17,15 +17,17 @@
     <p:sldId id="263" r:id="rId11"/>
     <p:sldId id="269" r:id="rId12"/>
     <p:sldId id="271" r:id="rId13"/>
-    <p:sldId id="270" r:id="rId14"/>
-    <p:sldId id="273" r:id="rId15"/>
-    <p:sldId id="274" r:id="rId16"/>
-    <p:sldId id="278" r:id="rId17"/>
-    <p:sldId id="279" r:id="rId18"/>
-    <p:sldId id="272" r:id="rId19"/>
-    <p:sldId id="281" r:id="rId20"/>
-    <p:sldId id="282" r:id="rId21"/>
-    <p:sldId id="283" r:id="rId22"/>
+    <p:sldId id="285" r:id="rId14"/>
+    <p:sldId id="270" r:id="rId15"/>
+    <p:sldId id="273" r:id="rId16"/>
+    <p:sldId id="274" r:id="rId17"/>
+    <p:sldId id="278" r:id="rId18"/>
+    <p:sldId id="284" r:id="rId19"/>
+    <p:sldId id="279" r:id="rId20"/>
+    <p:sldId id="272" r:id="rId21"/>
+    <p:sldId id="281" r:id="rId22"/>
+    <p:sldId id="282" r:id="rId23"/>
+    <p:sldId id="283" r:id="rId24"/>
   </p:sldIdLst>
   <p:sldSz cx="12192000" cy="6858000"/>
   <p:notesSz cx="6858000" cy="9144000"/>
@@ -126,7 +128,7 @@
   </p:defaultTextStyle>
   <p:extLst>
     <p:ext uri="{EFAFB233-063F-42B5-8137-9DF3F51BA10A}">
-      <p15:sldGuideLst xmlns:p15="http://schemas.microsoft.com/office/powerpoint/2012/main" xmlns="">
+      <p15:sldGuideLst xmlns:p15="http://schemas.microsoft.com/office/powerpoint/2012/main">
         <p15:guide id="1" orient="horz" pos="2160">
           <p15:clr>
             <a:srgbClr val="A4A3A4"/>
@@ -275,7 +277,7 @@
             <a:fld id="{601D6D48-1CD0-4D69-8E45-8FD8C1E00D98}" type="datetimeFigureOut">
               <a:rPr lang="de-DE" smtClean="0"/>
               <a:pPr/>
-              <a:t>15.03.2021</a:t>
+              <a:t>12.04.2021</a:t>
             </a:fld>
             <a:endParaRPr lang="de-DE"/>
           </a:p>
@@ -327,7 +329,7 @@
     </p:spTree>
     <p:extLst>
       <p:ext uri="{BB962C8B-B14F-4D97-AF65-F5344CB8AC3E}">
-        <p14:creationId xmlns:p14="http://schemas.microsoft.com/office/powerpoint/2010/main" xmlns="" val="4106576369"/>
+        <p14:creationId xmlns:p14="http://schemas.microsoft.com/office/powerpoint/2010/main" val="4106576369"/>
       </p:ext>
     </p:extLst>
   </p:cSld>
@@ -447,7 +449,7 @@
             <a:fld id="{601D6D48-1CD0-4D69-8E45-8FD8C1E00D98}" type="datetimeFigureOut">
               <a:rPr lang="de-DE" smtClean="0"/>
               <a:pPr/>
-              <a:t>15.03.2021</a:t>
+              <a:t>12.04.2021</a:t>
             </a:fld>
             <a:endParaRPr lang="de-DE"/>
           </a:p>
@@ -499,7 +501,7 @@
     </p:spTree>
     <p:extLst>
       <p:ext uri="{BB962C8B-B14F-4D97-AF65-F5344CB8AC3E}">
-        <p14:creationId xmlns:p14="http://schemas.microsoft.com/office/powerpoint/2010/main" xmlns="" val="2237685242"/>
+        <p14:creationId xmlns:p14="http://schemas.microsoft.com/office/powerpoint/2010/main" val="2237685242"/>
       </p:ext>
     </p:extLst>
   </p:cSld>
@@ -629,7 +631,7 @@
             <a:fld id="{601D6D48-1CD0-4D69-8E45-8FD8C1E00D98}" type="datetimeFigureOut">
               <a:rPr lang="de-DE" smtClean="0"/>
               <a:pPr/>
-              <a:t>15.03.2021</a:t>
+              <a:t>12.04.2021</a:t>
             </a:fld>
             <a:endParaRPr lang="de-DE"/>
           </a:p>
@@ -681,7 +683,7 @@
     </p:spTree>
     <p:extLst>
       <p:ext uri="{BB962C8B-B14F-4D97-AF65-F5344CB8AC3E}">
-        <p14:creationId xmlns:p14="http://schemas.microsoft.com/office/powerpoint/2010/main" xmlns="" val="3947205842"/>
+        <p14:creationId xmlns:p14="http://schemas.microsoft.com/office/powerpoint/2010/main" val="3947205842"/>
       </p:ext>
     </p:extLst>
   </p:cSld>
@@ -801,7 +803,7 @@
             <a:fld id="{601D6D48-1CD0-4D69-8E45-8FD8C1E00D98}" type="datetimeFigureOut">
               <a:rPr lang="de-DE" smtClean="0"/>
               <a:pPr/>
-              <a:t>15.03.2021</a:t>
+              <a:t>12.04.2021</a:t>
             </a:fld>
             <a:endParaRPr lang="de-DE"/>
           </a:p>
@@ -853,7 +855,7 @@
     </p:spTree>
     <p:extLst>
       <p:ext uri="{BB962C8B-B14F-4D97-AF65-F5344CB8AC3E}">
-        <p14:creationId xmlns:p14="http://schemas.microsoft.com/office/powerpoint/2010/main" xmlns="" val="3190547131"/>
+        <p14:creationId xmlns:p14="http://schemas.microsoft.com/office/powerpoint/2010/main" val="3190547131"/>
       </p:ext>
     </p:extLst>
   </p:cSld>
@@ -1049,7 +1051,7 @@
             <a:fld id="{601D6D48-1CD0-4D69-8E45-8FD8C1E00D98}" type="datetimeFigureOut">
               <a:rPr lang="de-DE" smtClean="0"/>
               <a:pPr/>
-              <a:t>15.03.2021</a:t>
+              <a:t>12.04.2021</a:t>
             </a:fld>
             <a:endParaRPr lang="de-DE"/>
           </a:p>
@@ -1101,7 +1103,7 @@
     </p:spTree>
     <p:extLst>
       <p:ext uri="{BB962C8B-B14F-4D97-AF65-F5344CB8AC3E}">
-        <p14:creationId xmlns:p14="http://schemas.microsoft.com/office/powerpoint/2010/main" xmlns="" val="354459686"/>
+        <p14:creationId xmlns:p14="http://schemas.microsoft.com/office/powerpoint/2010/main" val="354459686"/>
       </p:ext>
     </p:extLst>
   </p:cSld>
@@ -1283,7 +1285,7 @@
             <a:fld id="{601D6D48-1CD0-4D69-8E45-8FD8C1E00D98}" type="datetimeFigureOut">
               <a:rPr lang="de-DE" smtClean="0"/>
               <a:pPr/>
-              <a:t>15.03.2021</a:t>
+              <a:t>12.04.2021</a:t>
             </a:fld>
             <a:endParaRPr lang="de-DE"/>
           </a:p>
@@ -1335,7 +1337,7 @@
     </p:spTree>
     <p:extLst>
       <p:ext uri="{BB962C8B-B14F-4D97-AF65-F5344CB8AC3E}">
-        <p14:creationId xmlns:p14="http://schemas.microsoft.com/office/powerpoint/2010/main" xmlns="" val="3624499009"/>
+        <p14:creationId xmlns:p14="http://schemas.microsoft.com/office/powerpoint/2010/main" val="3624499009"/>
       </p:ext>
     </p:extLst>
   </p:cSld>
@@ -1652,7 +1654,7 @@
             <a:fld id="{601D6D48-1CD0-4D69-8E45-8FD8C1E00D98}" type="datetimeFigureOut">
               <a:rPr lang="de-DE" smtClean="0"/>
               <a:pPr/>
-              <a:t>15.03.2021</a:t>
+              <a:t>12.04.2021</a:t>
             </a:fld>
             <a:endParaRPr lang="de-DE"/>
           </a:p>
@@ -1704,7 +1706,7 @@
     </p:spTree>
     <p:extLst>
       <p:ext uri="{BB962C8B-B14F-4D97-AF65-F5344CB8AC3E}">
-        <p14:creationId xmlns:p14="http://schemas.microsoft.com/office/powerpoint/2010/main" xmlns="" val="873652365"/>
+        <p14:creationId xmlns:p14="http://schemas.microsoft.com/office/powerpoint/2010/main" val="873652365"/>
       </p:ext>
     </p:extLst>
   </p:cSld>
@@ -1772,7 +1774,7 @@
             <a:fld id="{601D6D48-1CD0-4D69-8E45-8FD8C1E00D98}" type="datetimeFigureOut">
               <a:rPr lang="de-DE" smtClean="0"/>
               <a:pPr/>
-              <a:t>15.03.2021</a:t>
+              <a:t>12.04.2021</a:t>
             </a:fld>
             <a:endParaRPr lang="de-DE"/>
           </a:p>
@@ -1824,7 +1826,7 @@
     </p:spTree>
     <p:extLst>
       <p:ext uri="{BB962C8B-B14F-4D97-AF65-F5344CB8AC3E}">
-        <p14:creationId xmlns:p14="http://schemas.microsoft.com/office/powerpoint/2010/main" xmlns="" val="3399419571"/>
+        <p14:creationId xmlns:p14="http://schemas.microsoft.com/office/powerpoint/2010/main" val="3399419571"/>
       </p:ext>
     </p:extLst>
   </p:cSld>
@@ -1869,7 +1871,7 @@
             <a:fld id="{601D6D48-1CD0-4D69-8E45-8FD8C1E00D98}" type="datetimeFigureOut">
               <a:rPr lang="de-DE" smtClean="0"/>
               <a:pPr/>
-              <a:t>15.03.2021</a:t>
+              <a:t>12.04.2021</a:t>
             </a:fld>
             <a:endParaRPr lang="de-DE"/>
           </a:p>
@@ -1921,7 +1923,7 @@
     </p:spTree>
     <p:extLst>
       <p:ext uri="{BB962C8B-B14F-4D97-AF65-F5344CB8AC3E}">
-        <p14:creationId xmlns:p14="http://schemas.microsoft.com/office/powerpoint/2010/main" xmlns="" val="1044668979"/>
+        <p14:creationId xmlns:p14="http://schemas.microsoft.com/office/powerpoint/2010/main" val="1044668979"/>
       </p:ext>
     </p:extLst>
   </p:cSld>
@@ -2148,7 +2150,7 @@
             <a:fld id="{601D6D48-1CD0-4D69-8E45-8FD8C1E00D98}" type="datetimeFigureOut">
               <a:rPr lang="de-DE" smtClean="0"/>
               <a:pPr/>
-              <a:t>15.03.2021</a:t>
+              <a:t>12.04.2021</a:t>
             </a:fld>
             <a:endParaRPr lang="de-DE"/>
           </a:p>
@@ -2200,7 +2202,7 @@
     </p:spTree>
     <p:extLst>
       <p:ext uri="{BB962C8B-B14F-4D97-AF65-F5344CB8AC3E}">
-        <p14:creationId xmlns:p14="http://schemas.microsoft.com/office/powerpoint/2010/main" xmlns="" val="789747347"/>
+        <p14:creationId xmlns:p14="http://schemas.microsoft.com/office/powerpoint/2010/main" val="789747347"/>
       </p:ext>
     </p:extLst>
   </p:cSld>
@@ -2407,7 +2409,7 @@
             <a:fld id="{601D6D48-1CD0-4D69-8E45-8FD8C1E00D98}" type="datetimeFigureOut">
               <a:rPr lang="de-DE" smtClean="0"/>
               <a:pPr/>
-              <a:t>15.03.2021</a:t>
+              <a:t>12.04.2021</a:t>
             </a:fld>
             <a:endParaRPr lang="de-DE"/>
           </a:p>
@@ -2459,7 +2461,7 @@
     </p:spTree>
     <p:extLst>
       <p:ext uri="{BB962C8B-B14F-4D97-AF65-F5344CB8AC3E}">
-        <p14:creationId xmlns:p14="http://schemas.microsoft.com/office/powerpoint/2010/main" xmlns="" val="674993363"/>
+        <p14:creationId xmlns:p14="http://schemas.microsoft.com/office/powerpoint/2010/main" val="674993363"/>
       </p:ext>
     </p:extLst>
   </p:cSld>
@@ -2622,7 +2624,7 @@
             <a:fld id="{601D6D48-1CD0-4D69-8E45-8FD8C1E00D98}" type="datetimeFigureOut">
               <a:rPr lang="de-DE" smtClean="0"/>
               <a:pPr/>
-              <a:t>15.03.2021</a:t>
+              <a:t>12.04.2021</a:t>
             </a:fld>
             <a:endParaRPr lang="de-DE"/>
           </a:p>
@@ -2710,7 +2712,7 @@
     </p:spTree>
     <p:extLst>
       <p:ext uri="{BB962C8B-B14F-4D97-AF65-F5344CB8AC3E}">
-        <p14:creationId xmlns:p14="http://schemas.microsoft.com/office/powerpoint/2010/main" xmlns="" val="1636046761"/>
+        <p14:creationId xmlns:p14="http://schemas.microsoft.com/office/powerpoint/2010/main" val="1636046761"/>
       </p:ext>
     </p:extLst>
   </p:cSld>
@@ -3033,7 +3035,7 @@
           <p:cNvPr id="2" name="Titel 1">
             <a:extLst>
               <a:ext uri="{FF2B5EF4-FFF2-40B4-BE49-F238E27FC236}">
-                <a16:creationId xmlns:a16="http://schemas.microsoft.com/office/drawing/2014/main" xmlns="" id="{19DD5F15-9C27-4730-80B4-4B8CA5C3D954}"/>
+                <a16:creationId xmlns:a16="http://schemas.microsoft.com/office/drawing/2014/main" id="{19DD5F15-9C27-4730-80B4-4B8CA5C3D954}"/>
               </a:ext>
             </a:extLst>
           </p:cNvPr>
@@ -3065,7 +3067,7 @@
           <p:cNvPr id="3" name="Inhaltsplatzhalter 2">
             <a:extLst>
               <a:ext uri="{FF2B5EF4-FFF2-40B4-BE49-F238E27FC236}">
-                <a16:creationId xmlns:a16="http://schemas.microsoft.com/office/drawing/2014/main" xmlns="" id="{E47621BA-2F32-4AB0-8C4C-5362CB4F4EC5}"/>
+                <a16:creationId xmlns:a16="http://schemas.microsoft.com/office/drawing/2014/main" id="{E47621BA-2F32-4AB0-8C4C-5362CB4F4EC5}"/>
               </a:ext>
             </a:extLst>
           </p:cNvPr>
@@ -3282,7 +3284,7 @@
             <a:hlinkClick r:id="rId2" action="ppaction://program"/>
             <a:extLst>
               <a:ext uri="{FF2B5EF4-FFF2-40B4-BE49-F238E27FC236}">
-                <a16:creationId xmlns:a16="http://schemas.microsoft.com/office/drawing/2014/main" xmlns="" id="{5D07DC50-91BF-4A42-B5AF-0D3DC4A229F5}"/>
+                <a16:creationId xmlns:a16="http://schemas.microsoft.com/office/drawing/2014/main" id="{5D07DC50-91BF-4A42-B5AF-0D3DC4A229F5}"/>
               </a:ext>
             </a:extLst>
           </p:cNvPr>
@@ -3326,7 +3328,7 @@
     </p:spTree>
     <p:extLst>
       <p:ext uri="{BB962C8B-B14F-4D97-AF65-F5344CB8AC3E}">
-        <p14:creationId xmlns:p14="http://schemas.microsoft.com/office/powerpoint/2010/main" xmlns="" val="1032884762"/>
+        <p14:creationId xmlns:p14="http://schemas.microsoft.com/office/powerpoint/2010/main" val="1032884762"/>
       </p:ext>
     </p:extLst>
   </p:cSld>
@@ -3358,7 +3360,7 @@
           <p:cNvPr id="2" name="Titel 1">
             <a:extLst>
               <a:ext uri="{FF2B5EF4-FFF2-40B4-BE49-F238E27FC236}">
-                <a16:creationId xmlns:a16="http://schemas.microsoft.com/office/drawing/2014/main" xmlns="" id="{19DD5F15-9C27-4730-80B4-4B8CA5C3D954}"/>
+                <a16:creationId xmlns:a16="http://schemas.microsoft.com/office/drawing/2014/main" id="{19DD5F15-9C27-4730-80B4-4B8CA5C3D954}"/>
               </a:ext>
             </a:extLst>
           </p:cNvPr>
@@ -3402,7 +3404,7 @@
           <p:cNvPr id="3" name="Inhaltsplatzhalter 2">
             <a:extLst>
               <a:ext uri="{FF2B5EF4-FFF2-40B4-BE49-F238E27FC236}">
-                <a16:creationId xmlns:a16="http://schemas.microsoft.com/office/drawing/2014/main" xmlns="" id="{E47621BA-2F32-4AB0-8C4C-5362CB4F4EC5}"/>
+                <a16:creationId xmlns:a16="http://schemas.microsoft.com/office/drawing/2014/main" id="{E47621BA-2F32-4AB0-8C4C-5362CB4F4EC5}"/>
               </a:ext>
             </a:extLst>
           </p:cNvPr>
@@ -3525,7 +3527,7 @@
             <a:hlinkClick r:id="rId2" action="ppaction://program"/>
             <a:extLst>
               <a:ext uri="{FF2B5EF4-FFF2-40B4-BE49-F238E27FC236}">
-                <a16:creationId xmlns:a16="http://schemas.microsoft.com/office/drawing/2014/main" xmlns="" id="{5D07DC50-91BF-4A42-B5AF-0D3DC4A229F5}"/>
+                <a16:creationId xmlns:a16="http://schemas.microsoft.com/office/drawing/2014/main" id="{5D07DC50-91BF-4A42-B5AF-0D3DC4A229F5}"/>
               </a:ext>
             </a:extLst>
           </p:cNvPr>
@@ -3569,7 +3571,7 @@
     </p:spTree>
     <p:extLst>
       <p:ext uri="{BB962C8B-B14F-4D97-AF65-F5344CB8AC3E}">
-        <p14:creationId xmlns:p14="http://schemas.microsoft.com/office/powerpoint/2010/main" xmlns="" val="4136867960"/>
+        <p14:creationId xmlns:p14="http://schemas.microsoft.com/office/powerpoint/2010/main" val="4136867960"/>
       </p:ext>
     </p:extLst>
   </p:cSld>
@@ -3601,7 +3603,7 @@
           <p:cNvPr id="2" name="Titel 1">
             <a:extLst>
               <a:ext uri="{FF2B5EF4-FFF2-40B4-BE49-F238E27FC236}">
-                <a16:creationId xmlns:a16="http://schemas.microsoft.com/office/drawing/2014/main" xmlns="" id="{19DD5F15-9C27-4730-80B4-4B8CA5C3D954}"/>
+                <a16:creationId xmlns:a16="http://schemas.microsoft.com/office/drawing/2014/main" id="{19DD5F15-9C27-4730-80B4-4B8CA5C3D954}"/>
               </a:ext>
             </a:extLst>
           </p:cNvPr>
@@ -3629,7 +3631,7 @@
           <p:cNvPr id="3" name="Inhaltsplatzhalter 2">
             <a:extLst>
               <a:ext uri="{FF2B5EF4-FFF2-40B4-BE49-F238E27FC236}">
-                <a16:creationId xmlns:a16="http://schemas.microsoft.com/office/drawing/2014/main" xmlns="" id="{E47621BA-2F32-4AB0-8C4C-5362CB4F4EC5}"/>
+                <a16:creationId xmlns:a16="http://schemas.microsoft.com/office/drawing/2014/main" id="{E47621BA-2F32-4AB0-8C4C-5362CB4F4EC5}"/>
               </a:ext>
             </a:extLst>
           </p:cNvPr>
@@ -3740,7 +3742,7 @@
             <a:hlinkClick r:id="rId2" action="ppaction://program"/>
             <a:extLst>
               <a:ext uri="{FF2B5EF4-FFF2-40B4-BE49-F238E27FC236}">
-                <a16:creationId xmlns:a16="http://schemas.microsoft.com/office/drawing/2014/main" xmlns="" id="{5D07DC50-91BF-4A42-B5AF-0D3DC4A229F5}"/>
+                <a16:creationId xmlns:a16="http://schemas.microsoft.com/office/drawing/2014/main" id="{5D07DC50-91BF-4A42-B5AF-0D3DC4A229F5}"/>
               </a:ext>
             </a:extLst>
           </p:cNvPr>
@@ -3813,7 +3815,7 @@
     </p:spTree>
     <p:extLst>
       <p:ext uri="{BB962C8B-B14F-4D97-AF65-F5344CB8AC3E}">
-        <p14:creationId xmlns:p14="http://schemas.microsoft.com/office/powerpoint/2010/main" xmlns="" val="1338737363"/>
+        <p14:creationId xmlns:p14="http://schemas.microsoft.com/office/powerpoint/2010/main" val="1338737363"/>
       </p:ext>
     </p:extLst>
   </p:cSld>
@@ -3845,7 +3847,7 @@
           <p:cNvPr id="2" name="Titel 1">
             <a:extLst>
               <a:ext uri="{FF2B5EF4-FFF2-40B4-BE49-F238E27FC236}">
-                <a16:creationId xmlns:a16="http://schemas.microsoft.com/office/drawing/2014/main" xmlns="" id="{19DD5F15-9C27-4730-80B4-4B8CA5C3D954}"/>
+                <a16:creationId xmlns:a16="http://schemas.microsoft.com/office/drawing/2014/main" id="{19DD5F15-9C27-4730-80B4-4B8CA5C3D954}"/>
               </a:ext>
             </a:extLst>
           </p:cNvPr>
@@ -3867,7 +3869,7 @@
             </a:r>
             <a:r>
               <a:rPr lang="de-DE" dirty="0"/>
-              <a:t> Livestream -  View</a:t>
+              <a:t> Power On</a:t>
             </a:r>
           </a:p>
         </p:txBody>
@@ -3877,7 +3879,7 @@
           <p:cNvPr id="3" name="Inhaltsplatzhalter 2">
             <a:extLst>
               <a:ext uri="{FF2B5EF4-FFF2-40B4-BE49-F238E27FC236}">
-                <a16:creationId xmlns:a16="http://schemas.microsoft.com/office/drawing/2014/main" xmlns="" id="{E47621BA-2F32-4AB0-8C4C-5362CB4F4EC5}"/>
+                <a16:creationId xmlns:a16="http://schemas.microsoft.com/office/drawing/2014/main" id="{E47621BA-2F32-4AB0-8C4C-5362CB4F4EC5}"/>
               </a:ext>
             </a:extLst>
           </p:cNvPr>
@@ -3896,42 +3898,53 @@
         </p:spPr>
         <p:txBody>
           <a:bodyPr>
-            <a:normAutofit fontScale="92500" lnSpcReduction="10000"/>
+            <a:normAutofit fontScale="92500" lnSpcReduction="20000"/>
           </a:bodyPr>
           <a:lstStyle/>
           <a:p>
             <a:r>
               <a:rPr lang="de-DE" dirty="0" err="1"/>
-              <a:t>Toggles</a:t>
-            </a:r>
-            <a:r>
-              <a:rPr lang="de-DE" dirty="0"/>
-              <a:t> </a:t>
-            </a:r>
-            <a:r>
-              <a:rPr lang="de-DE" dirty="0" err="1"/>
-              <a:t>beamer</a:t>
-            </a:r>
-            <a:r>
-              <a:rPr lang="de-DE" dirty="0"/>
-              <a:t> </a:t>
-            </a:r>
-            <a:r>
-              <a:rPr lang="de-DE" dirty="0" err="1"/>
-              <a:t>between</a:t>
-            </a:r>
-            <a:r>
-              <a:rPr lang="de-DE" dirty="0"/>
-              <a:t> HDMI 2 (Livestream -  </a:t>
-            </a:r>
-            <a:r>
-              <a:rPr lang="de-DE" dirty="0" err="1"/>
-              <a:t>view</a:t>
-            </a:r>
-            <a:r>
-              <a:rPr lang="de-DE" dirty="0"/>
-              <a:t>) and HDMI 1 (Laptop -View)</a:t>
-            </a:r>
+              <a:t>Baemer</a:t>
+            </a:r>
+            <a:r>
+              <a:rPr lang="de-DE" dirty="0"/>
+              <a:t> Switch Power on </a:t>
+            </a:r>
+          </a:p>
+          <a:p>
+            <a:r>
+              <a:rPr lang="de-DE" dirty="0" err="1"/>
+              <a:t>Used</a:t>
+            </a:r>
+            <a:r>
+              <a:rPr lang="de-DE" dirty="0"/>
+              <a:t> </a:t>
+            </a:r>
+            <a:r>
+              <a:rPr lang="de-DE" dirty="0" err="1"/>
+              <a:t>for</a:t>
+            </a:r>
+            <a:r>
+              <a:rPr lang="de-DE" dirty="0"/>
+              <a:t> </a:t>
+            </a:r>
+            <a:r>
+              <a:rPr lang="de-DE" dirty="0" err="1"/>
+              <a:t>pre</a:t>
+            </a:r>
+            <a:r>
+              <a:rPr lang="de-DE" dirty="0"/>
+              <a:t> </a:t>
+            </a:r>
+            <a:r>
+              <a:rPr lang="de-DE" dirty="0" err="1"/>
+              <a:t>church</a:t>
+            </a:r>
+            <a:r>
+              <a:rPr lang="de-DE"/>
+              <a:t> check</a:t>
+            </a:r>
+            <a:endParaRPr lang="de-DE" dirty="0"/>
           </a:p>
           <a:p>
             <a:endParaRPr lang="de-DE" dirty="0"/>
@@ -3955,7 +3968,7 @@
                   <a:srgbClr val="FF0000"/>
                 </a:solidFill>
               </a:rPr>
-              <a:t>                                                                         BS</a:t>
+              <a:t>                                                                         BP</a:t>
             </a:r>
             <a:endParaRPr lang="de-DE" dirty="0"/>
           </a:p>
@@ -3977,15 +3990,7 @@
             </a:pPr>
             <a:r>
               <a:rPr lang="fr-FR" dirty="0"/>
-              <a:t>JokiAutomation.exe  "</a:t>
-            </a:r>
-            <a:r>
-              <a:rPr lang="fr-FR" dirty="0" err="1"/>
-              <a:t>BEAMER_LiveStream</a:t>
-            </a:r>
-            <a:r>
-              <a:rPr lang="fr-FR" dirty="0"/>
-              <a:t>"</a:t>
+              <a:t>JokiAutomation.exe  "BEAMER_ON"</a:t>
             </a:r>
             <a:endParaRPr lang="de-DE" dirty="0"/>
           </a:p>
@@ -3997,7 +4002,7 @@
             <a:hlinkClick r:id="rId2" action="ppaction://program"/>
             <a:extLst>
               <a:ext uri="{FF2B5EF4-FFF2-40B4-BE49-F238E27FC236}">
-                <a16:creationId xmlns:a16="http://schemas.microsoft.com/office/drawing/2014/main" xmlns="" id="{5D07DC50-91BF-4A42-B5AF-0D3DC4A229F5}"/>
+                <a16:creationId xmlns:a16="http://schemas.microsoft.com/office/drawing/2014/main" id="{5D07DC50-91BF-4A42-B5AF-0D3DC4A229F5}"/>
               </a:ext>
             </a:extLst>
           </p:cNvPr>
@@ -4070,7 +4075,7 @@
     </p:spTree>
     <p:extLst>
       <p:ext uri="{BB962C8B-B14F-4D97-AF65-F5344CB8AC3E}">
-        <p14:creationId xmlns:p14="http://schemas.microsoft.com/office/powerpoint/2010/main" xmlns="" val="2139964971"/>
+        <p14:creationId xmlns:p14="http://schemas.microsoft.com/office/powerpoint/2010/main" val="2139964971"/>
       </p:ext>
     </p:extLst>
   </p:cSld>
@@ -4102,7 +4107,7 @@
           <p:cNvPr id="2" name="Titel 1">
             <a:extLst>
               <a:ext uri="{FF2B5EF4-FFF2-40B4-BE49-F238E27FC236}">
-                <a16:creationId xmlns:a16="http://schemas.microsoft.com/office/drawing/2014/main" xmlns="" id="{19DD5F15-9C27-4730-80B4-4B8CA5C3D954}"/>
+                <a16:creationId xmlns:a16="http://schemas.microsoft.com/office/drawing/2014/main" id="{19DD5F15-9C27-4730-80B4-4B8CA5C3D954}"/>
               </a:ext>
             </a:extLst>
           </p:cNvPr>
@@ -4124,7 +4129,7 @@
             </a:r>
             <a:r>
               <a:rPr lang="de-DE" dirty="0"/>
-              <a:t> Videoclip Text 1  Text 2</a:t>
+              <a:t> Livestream -  View</a:t>
             </a:r>
           </a:p>
         </p:txBody>
@@ -4134,7 +4139,7 @@
           <p:cNvPr id="3" name="Inhaltsplatzhalter 2">
             <a:extLst>
               <a:ext uri="{FF2B5EF4-FFF2-40B4-BE49-F238E27FC236}">
-                <a16:creationId xmlns:a16="http://schemas.microsoft.com/office/drawing/2014/main" xmlns="" id="{E47621BA-2F32-4AB0-8C4C-5362CB4F4EC5}"/>
+                <a16:creationId xmlns:a16="http://schemas.microsoft.com/office/drawing/2014/main" id="{E47621BA-2F32-4AB0-8C4C-5362CB4F4EC5}"/>
               </a:ext>
             </a:extLst>
           </p:cNvPr>
@@ -4153,49 +4158,51 @@
         </p:spPr>
         <p:txBody>
           <a:bodyPr>
-            <a:normAutofit/>
+            <a:normAutofit fontScale="92500" lnSpcReduction="10000"/>
           </a:bodyPr>
           <a:lstStyle/>
           <a:p>
             <a:r>
               <a:rPr lang="de-DE" dirty="0" err="1"/>
-              <a:t>Beamer</a:t>
-            </a:r>
-            <a:r>
-              <a:rPr lang="de-DE" dirty="0"/>
-              <a:t> analog </a:t>
-            </a:r>
-            <a:r>
-              <a:rPr lang="de-DE" dirty="0" err="1"/>
-              <a:t>input</a:t>
-            </a:r>
-            <a:endParaRPr lang="de-DE" dirty="0"/>
-          </a:p>
-          <a:p>
-            <a:r>
-              <a:rPr lang="de-DE" dirty="0"/>
-              <a:t>Audio Mix Profile ‚Diashow‘</a:t>
-            </a:r>
-          </a:p>
-          <a:p>
-            <a:r>
-              <a:rPr lang="de-DE" dirty="0"/>
-              <a:t>HDMI Switch </a:t>
-            </a:r>
-            <a:r>
-              <a:rPr lang="de-DE" dirty="0" err="1"/>
-              <a:t>channel</a:t>
-            </a:r>
-            <a:r>
-              <a:rPr lang="de-DE" dirty="0"/>
-              <a:t> 1 (Laptop PPP)</a:t>
-            </a:r>
-          </a:p>
-          <a:p>
-            <a:r>
-              <a:rPr lang="de-DE" dirty="0"/>
-              <a:t>Pause, Text 1 and Text 2</a:t>
-            </a:r>
+              <a:t>Toggles</a:t>
+            </a:r>
+            <a:r>
+              <a:rPr lang="de-DE" dirty="0"/>
+              <a:t> </a:t>
+            </a:r>
+            <a:r>
+              <a:rPr lang="de-DE" dirty="0" err="1"/>
+              <a:t>beamer</a:t>
+            </a:r>
+            <a:r>
+              <a:rPr lang="de-DE" dirty="0"/>
+              <a:t> </a:t>
+            </a:r>
+            <a:r>
+              <a:rPr lang="de-DE" dirty="0" err="1"/>
+              <a:t>between</a:t>
+            </a:r>
+            <a:r>
+              <a:rPr lang="de-DE" dirty="0"/>
+              <a:t> HDMI 2 (Livestream -  </a:t>
+            </a:r>
+            <a:r>
+              <a:rPr lang="de-DE" dirty="0" err="1"/>
+              <a:t>view</a:t>
+            </a:r>
+            <a:r>
+              <a:rPr lang="de-DE" dirty="0"/>
+              <a:t>) and HDMI 1 (Laptop -View)</a:t>
+            </a:r>
+          </a:p>
+          <a:p>
+            <a:endParaRPr lang="de-DE" dirty="0"/>
+          </a:p>
+          <a:p>
+            <a:endParaRPr lang="de-DE" dirty="0"/>
+          </a:p>
+          <a:p>
+            <a:endParaRPr lang="de-DE" dirty="0"/>
           </a:p>
           <a:p>
             <a:endParaRPr lang="de-DE" dirty="0"/>
@@ -4210,29 +4217,39 @@
                   <a:srgbClr val="FF0000"/>
                 </a:solidFill>
               </a:rPr>
-              <a:t>                                                                               BA</a:t>
-            </a:r>
-            <a:endParaRPr lang="de-DE" dirty="0"/>
-          </a:p>
-          <a:p>
+              <a:t>                                                                         BS</a:t>
+            </a:r>
             <a:endParaRPr lang="de-DE" dirty="0"/>
           </a:p>
           <a:p>
             <a:pPr marL="0" indent="0">
               <a:buNone/>
             </a:pPr>
-            <a:r>
-              <a:rPr lang="de-DE" sz="1800" dirty="0"/>
-              <a:t>JokiAutomation.exe "</a:t>
-            </a:r>
-            <a:r>
-              <a:rPr lang="de-DE" sz="1800" dirty="0" err="1"/>
-              <a:t>BEAMER_VideoClip</a:t>
-            </a:r>
-            <a:r>
-              <a:rPr lang="de-DE" sz="1800" dirty="0"/>
-              <a:t>" "Urheberrechtlich keine Liveübertragung" "Es geht in Kürze weiter"</a:t>
-            </a:r>
+            <a:endParaRPr lang="de-DE" dirty="0"/>
+          </a:p>
+          <a:p>
+            <a:pPr marL="0" indent="0">
+              <a:buNone/>
+            </a:pPr>
+            <a:endParaRPr lang="de-DE" dirty="0"/>
+          </a:p>
+          <a:p>
+            <a:pPr marL="0" indent="0">
+              <a:buNone/>
+            </a:pPr>
+            <a:r>
+              <a:rPr lang="fr-FR" dirty="0"/>
+              <a:t>JokiAutomation.exe  "</a:t>
+            </a:r>
+            <a:r>
+              <a:rPr lang="fr-FR" dirty="0" err="1"/>
+              <a:t>BEAMER_LiveStream</a:t>
+            </a:r>
+            <a:r>
+              <a:rPr lang="fr-FR" dirty="0"/>
+              <a:t>"</a:t>
+            </a:r>
+            <a:endParaRPr lang="de-DE" dirty="0"/>
           </a:p>
         </p:txBody>
       </p:sp>
@@ -4242,7 +4259,7 @@
             <a:hlinkClick r:id="rId2" action="ppaction://program"/>
             <a:extLst>
               <a:ext uri="{FF2B5EF4-FFF2-40B4-BE49-F238E27FC236}">
-                <a16:creationId xmlns:a16="http://schemas.microsoft.com/office/drawing/2014/main" xmlns="" id="{5D07DC50-91BF-4A42-B5AF-0D3DC4A229F5}"/>
+                <a16:creationId xmlns:a16="http://schemas.microsoft.com/office/drawing/2014/main" id="{5D07DC50-91BF-4A42-B5AF-0D3DC4A229F5}"/>
               </a:ext>
             </a:extLst>
           </p:cNvPr>
@@ -4251,7 +4268,7 @@
         </p:nvSpPr>
         <p:spPr>
           <a:xfrm>
-            <a:off x="5307724" y="3983420"/>
+            <a:off x="5181600" y="3520965"/>
             <a:ext cx="1492469" cy="693683"/>
           </a:xfrm>
           <a:prstGeom prst="rightArrow">
@@ -4315,7 +4332,7 @@
     </p:spTree>
     <p:extLst>
       <p:ext uri="{BB962C8B-B14F-4D97-AF65-F5344CB8AC3E}">
-        <p14:creationId xmlns:p14="http://schemas.microsoft.com/office/powerpoint/2010/main" xmlns="" val="1477986772"/>
+        <p14:creationId xmlns:p14="http://schemas.microsoft.com/office/powerpoint/2010/main" val="3741507169"/>
       </p:ext>
     </p:extLst>
   </p:cSld>
@@ -4347,7 +4364,7 @@
           <p:cNvPr id="2" name="Titel 1">
             <a:extLst>
               <a:ext uri="{FF2B5EF4-FFF2-40B4-BE49-F238E27FC236}">
-                <a16:creationId xmlns:a16="http://schemas.microsoft.com/office/drawing/2014/main" xmlns="" id="{19DD5F15-9C27-4730-80B4-4B8CA5C3D954}"/>
+                <a16:creationId xmlns:a16="http://schemas.microsoft.com/office/drawing/2014/main" id="{19DD5F15-9C27-4730-80B4-4B8CA5C3D954}"/>
               </a:ext>
             </a:extLst>
           </p:cNvPr>
@@ -4369,13 +4386,8 @@
             </a:r>
             <a:r>
               <a:rPr lang="de-DE" dirty="0"/>
-              <a:t> Mute / </a:t>
-            </a:r>
-            <a:r>
-              <a:rPr lang="de-DE" dirty="0" err="1"/>
-              <a:t>Demute</a:t>
-            </a:r>
-            <a:endParaRPr lang="de-DE" dirty="0"/>
+              <a:t> Videoclip Text 1  Text 2</a:t>
+            </a:r>
           </a:p>
         </p:txBody>
       </p:sp>
@@ -4384,7 +4396,7 @@
           <p:cNvPr id="3" name="Inhaltsplatzhalter 2">
             <a:extLst>
               <a:ext uri="{FF2B5EF4-FFF2-40B4-BE49-F238E27FC236}">
-                <a16:creationId xmlns:a16="http://schemas.microsoft.com/office/drawing/2014/main" xmlns="" id="{E47621BA-2F32-4AB0-8C4C-5362CB4F4EC5}"/>
+                <a16:creationId xmlns:a16="http://schemas.microsoft.com/office/drawing/2014/main" id="{E47621BA-2F32-4AB0-8C4C-5362CB4F4EC5}"/>
               </a:ext>
             </a:extLst>
           </p:cNvPr>
@@ -4409,42 +4421,43 @@
           <a:p>
             <a:r>
               <a:rPr lang="de-DE" dirty="0" err="1"/>
-              <a:t>mutes</a:t>
-            </a:r>
-            <a:r>
-              <a:rPr lang="de-DE" dirty="0"/>
-              <a:t> / </a:t>
-            </a:r>
-            <a:r>
-              <a:rPr lang="de-DE" dirty="0" err="1"/>
-              <a:t>demutes</a:t>
-            </a:r>
-            <a:r>
-              <a:rPr lang="de-DE" dirty="0"/>
-              <a:t> </a:t>
-            </a:r>
-            <a:r>
-              <a:rPr lang="de-DE" dirty="0" err="1"/>
-              <a:t>the</a:t>
-            </a:r>
-            <a:r>
-              <a:rPr lang="de-DE" dirty="0"/>
-              <a:t> </a:t>
-            </a:r>
-            <a:r>
-              <a:rPr lang="de-DE" dirty="0" err="1"/>
               <a:t>Beamer</a:t>
             </a:r>
-            <a:endParaRPr lang="de-DE" dirty="0"/>
-          </a:p>
-          <a:p>
-            <a:endParaRPr lang="de-DE" dirty="0"/>
-          </a:p>
-          <a:p>
-            <a:endParaRPr lang="de-DE" dirty="0"/>
-          </a:p>
-          <a:p>
-            <a:endParaRPr lang="de-DE" dirty="0"/>
+            <a:r>
+              <a:rPr lang="de-DE" dirty="0"/>
+              <a:t> analog </a:t>
+            </a:r>
+            <a:r>
+              <a:rPr lang="de-DE" dirty="0" err="1"/>
+              <a:t>input</a:t>
+            </a:r>
+            <a:endParaRPr lang="de-DE" dirty="0"/>
+          </a:p>
+          <a:p>
+            <a:r>
+              <a:rPr lang="de-DE" dirty="0"/>
+              <a:t>Audio Mix Profile ‚Diashow‘</a:t>
+            </a:r>
+          </a:p>
+          <a:p>
+            <a:r>
+              <a:rPr lang="de-DE" dirty="0"/>
+              <a:t>HDMI Switch </a:t>
+            </a:r>
+            <a:r>
+              <a:rPr lang="de-DE" dirty="0" err="1"/>
+              <a:t>channel</a:t>
+            </a:r>
+            <a:r>
+              <a:rPr lang="de-DE" dirty="0"/>
+              <a:t> 1 (Laptop PPP)</a:t>
+            </a:r>
+          </a:p>
+          <a:p>
+            <a:r>
+              <a:rPr lang="de-DE" dirty="0"/>
+              <a:t>Pause, Text 1 and Text 2</a:t>
+            </a:r>
           </a:p>
           <a:p>
             <a:endParaRPr lang="de-DE" dirty="0"/>
@@ -4459,33 +4472,29 @@
                   <a:srgbClr val="FF0000"/>
                 </a:solidFill>
               </a:rPr>
-              <a:t>                                                                         BM</a:t>
-            </a:r>
+              <a:t>                                                                               BA</a:t>
+            </a:r>
+            <a:endParaRPr lang="de-DE" dirty="0"/>
+          </a:p>
+          <a:p>
             <a:endParaRPr lang="de-DE" dirty="0"/>
           </a:p>
           <a:p>
             <a:pPr marL="0" indent="0">
               <a:buNone/>
             </a:pPr>
-            <a:endParaRPr lang="de-DE" dirty="0"/>
-          </a:p>
-          <a:p>
-            <a:pPr marL="0" indent="0">
-              <a:buNone/>
-            </a:pPr>
-            <a:r>
-              <a:rPr lang="fr-FR" dirty="0"/>
-              <a:t>JokiAutomation.exe  "</a:t>
-            </a:r>
-            <a:r>
-              <a:rPr lang="fr-FR" dirty="0" err="1"/>
-              <a:t>BEAMER_Mute</a:t>
-            </a:r>
-            <a:r>
-              <a:rPr lang="fr-FR" dirty="0"/>
-              <a:t>"</a:t>
-            </a:r>
-            <a:endParaRPr lang="de-DE" dirty="0"/>
+            <a:r>
+              <a:rPr lang="de-DE" sz="1800" dirty="0"/>
+              <a:t>JokiAutomation.exe "</a:t>
+            </a:r>
+            <a:r>
+              <a:rPr lang="de-DE" sz="1800" dirty="0" err="1"/>
+              <a:t>BEAMER_VideoClip</a:t>
+            </a:r>
+            <a:r>
+              <a:rPr lang="de-DE" sz="1800" dirty="0"/>
+              <a:t>" "Urheberrechtlich keine Liveübertragung" "Es geht in Kürze weiter"</a:t>
+            </a:r>
           </a:p>
         </p:txBody>
       </p:sp>
@@ -4495,7 +4504,7 @@
             <a:hlinkClick r:id="rId2" action="ppaction://program"/>
             <a:extLst>
               <a:ext uri="{FF2B5EF4-FFF2-40B4-BE49-F238E27FC236}">
-                <a16:creationId xmlns:a16="http://schemas.microsoft.com/office/drawing/2014/main" xmlns="" id="{5D07DC50-91BF-4A42-B5AF-0D3DC4A229F5}"/>
+                <a16:creationId xmlns:a16="http://schemas.microsoft.com/office/drawing/2014/main" id="{5D07DC50-91BF-4A42-B5AF-0D3DC4A229F5}"/>
               </a:ext>
             </a:extLst>
           </p:cNvPr>
@@ -4568,7 +4577,7 @@
     </p:spTree>
     <p:extLst>
       <p:ext uri="{BB962C8B-B14F-4D97-AF65-F5344CB8AC3E}">
-        <p14:creationId xmlns:p14="http://schemas.microsoft.com/office/powerpoint/2010/main" xmlns="" val="341270607"/>
+        <p14:creationId xmlns:p14="http://schemas.microsoft.com/office/powerpoint/2010/main" val="1477986772"/>
       </p:ext>
     </p:extLst>
   </p:cSld>
@@ -4600,7 +4609,7 @@
           <p:cNvPr id="2" name="Titel 1">
             <a:extLst>
               <a:ext uri="{FF2B5EF4-FFF2-40B4-BE49-F238E27FC236}">
-                <a16:creationId xmlns:a16="http://schemas.microsoft.com/office/drawing/2014/main" xmlns="" id="{19DD5F15-9C27-4730-80B4-4B8CA5C3D954}"/>
+                <a16:creationId xmlns:a16="http://schemas.microsoft.com/office/drawing/2014/main" id="{19DD5F15-9C27-4730-80B4-4B8CA5C3D954}"/>
               </a:ext>
             </a:extLst>
           </p:cNvPr>
@@ -4617,9 +4626,18 @@
           <a:lstStyle/>
           <a:p>
             <a:r>
-              <a:rPr lang="de-DE" dirty="0"/>
-              <a:t>Backup – Recorder Start</a:t>
-            </a:r>
+              <a:rPr lang="de-DE" dirty="0" err="1"/>
+              <a:t>Beamer</a:t>
+            </a:r>
+            <a:r>
+              <a:rPr lang="de-DE" dirty="0"/>
+              <a:t> Mute / </a:t>
+            </a:r>
+            <a:r>
+              <a:rPr lang="de-DE" dirty="0" err="1"/>
+              <a:t>Demute</a:t>
+            </a:r>
+            <a:endParaRPr lang="de-DE" dirty="0"/>
           </a:p>
         </p:txBody>
       </p:sp>
@@ -4628,7 +4646,7 @@
           <p:cNvPr id="3" name="Inhaltsplatzhalter 2">
             <a:extLst>
               <a:ext uri="{FF2B5EF4-FFF2-40B4-BE49-F238E27FC236}">
-                <a16:creationId xmlns:a16="http://schemas.microsoft.com/office/drawing/2014/main" xmlns="" id="{E47621BA-2F32-4AB0-8C4C-5362CB4F4EC5}"/>
+                <a16:creationId xmlns:a16="http://schemas.microsoft.com/office/drawing/2014/main" id="{E47621BA-2F32-4AB0-8C4C-5362CB4F4EC5}"/>
               </a:ext>
             </a:extLst>
           </p:cNvPr>
@@ -4647,120 +4665,38 @@
         </p:spPr>
         <p:txBody>
           <a:bodyPr>
-            <a:normAutofit fontScale="92500" lnSpcReduction="20000"/>
+            <a:normAutofit/>
           </a:bodyPr>
           <a:lstStyle/>
           <a:p>
             <a:r>
               <a:rPr lang="de-DE" dirty="0" err="1"/>
-              <a:t>starts</a:t>
-            </a:r>
-            <a:r>
-              <a:rPr lang="de-DE" dirty="0"/>
-              <a:t> the </a:t>
-            </a:r>
-            <a:r>
-              <a:rPr lang="de-DE" dirty="0" err="1"/>
-              <a:t>backup</a:t>
-            </a:r>
-            <a:r>
-              <a:rPr lang="de-DE" dirty="0"/>
-              <a:t> </a:t>
-            </a:r>
-            <a:r>
-              <a:rPr lang="de-DE" dirty="0" err="1"/>
-              <a:t>recorder</a:t>
-            </a:r>
-            <a:endParaRPr lang="de-DE" dirty="0"/>
-          </a:p>
-          <a:p>
-            <a:r>
-              <a:rPr lang="de-DE" dirty="0" err="1"/>
-              <a:t>only</a:t>
-            </a:r>
-            <a:r>
-              <a:rPr lang="de-DE" dirty="0"/>
-              <a:t> </a:t>
-            </a:r>
-            <a:r>
-              <a:rPr lang="de-DE" dirty="0" err="1"/>
-              <a:t>used</a:t>
-            </a:r>
-            <a:r>
-              <a:rPr lang="de-DE" dirty="0"/>
-              <a:t> </a:t>
-            </a:r>
-            <a:r>
-              <a:rPr lang="de-DE" dirty="0" err="1"/>
-              <a:t>for</a:t>
-            </a:r>
-            <a:r>
-              <a:rPr lang="de-DE" dirty="0"/>
-              <a:t> </a:t>
-            </a:r>
-            <a:r>
-              <a:rPr lang="de-DE" dirty="0" err="1"/>
-              <a:t>pre</a:t>
-            </a:r>
-            <a:r>
-              <a:rPr lang="de-DE" dirty="0"/>
-              <a:t> </a:t>
-            </a:r>
-            <a:r>
-              <a:rPr lang="de-DE" dirty="0" err="1"/>
-              <a:t>church</a:t>
-            </a:r>
-            <a:r>
-              <a:rPr lang="de-DE" dirty="0"/>
-              <a:t> check, the </a:t>
-            </a:r>
-            <a:r>
-              <a:rPr lang="de-DE" dirty="0" err="1"/>
-              <a:t>backup</a:t>
-            </a:r>
-            <a:r>
-              <a:rPr lang="de-DE" dirty="0"/>
-              <a:t> </a:t>
-            </a:r>
-            <a:r>
-              <a:rPr lang="de-DE" dirty="0" err="1"/>
-              <a:t>recorder</a:t>
-            </a:r>
-            <a:r>
-              <a:rPr lang="de-DE" dirty="0"/>
-              <a:t> </a:t>
-            </a:r>
-            <a:r>
-              <a:rPr lang="de-DE" dirty="0" err="1"/>
-              <a:t>starts</a:t>
-            </a:r>
-            <a:r>
-              <a:rPr lang="de-DE" dirty="0"/>
-              <a:t> </a:t>
-            </a:r>
-            <a:r>
-              <a:rPr lang="de-DE" dirty="0" err="1"/>
-              <a:t>with</a:t>
-            </a:r>
-            <a:r>
-              <a:rPr lang="de-DE" dirty="0"/>
-              <a:t> </a:t>
-            </a:r>
-            <a:r>
-              <a:rPr lang="de-DE" dirty="0" err="1"/>
-              <a:t>sequence</a:t>
-            </a:r>
-            <a:r>
-              <a:rPr lang="de-DE" dirty="0"/>
-              <a:t> </a:t>
-            </a:r>
-            <a:r>
-              <a:rPr lang="de-DE" dirty="0" err="1"/>
-              <a:t>Timer</a:t>
-            </a:r>
-            <a:endParaRPr lang="de-DE" dirty="0"/>
-          </a:p>
-          <a:p>
+              <a:t>mutes</a:t>
+            </a:r>
+            <a:r>
+              <a:rPr lang="de-DE" dirty="0"/>
+              <a:t> / </a:t>
+            </a:r>
+            <a:r>
+              <a:rPr lang="de-DE" dirty="0" err="1"/>
+              <a:t>demutes</a:t>
+            </a:r>
+            <a:r>
+              <a:rPr lang="de-DE" dirty="0"/>
+              <a:t> </a:t>
+            </a:r>
+            <a:r>
+              <a:rPr lang="de-DE" dirty="0" err="1"/>
+              <a:t>the</a:t>
+            </a:r>
+            <a:r>
+              <a:rPr lang="de-DE" dirty="0"/>
+              <a:t> </a:t>
+            </a:r>
+            <a:r>
+              <a:rPr lang="de-DE" dirty="0" err="1"/>
+              <a:t>Beamer</a:t>
+            </a:r>
             <a:endParaRPr lang="de-DE" dirty="0"/>
           </a:p>
           <a:p>
@@ -4785,7 +4721,7 @@
                   <a:srgbClr val="FF0000"/>
                 </a:solidFill>
               </a:rPr>
-              <a:t>                                                                         RC</a:t>
+              <a:t>                                                                         BM</a:t>
             </a:r>
             <a:endParaRPr lang="de-DE" dirty="0"/>
           </a:p>
@@ -4801,11 +4737,11 @@
             </a:pPr>
             <a:r>
               <a:rPr lang="fr-FR" dirty="0"/>
-              <a:t>JokiAutomation.exe "</a:t>
+              <a:t>JokiAutomation.exe  "</a:t>
             </a:r>
             <a:r>
               <a:rPr lang="fr-FR" dirty="0" err="1"/>
-              <a:t>Backup_Start</a:t>
+              <a:t>BEAMER_Mute</a:t>
             </a:r>
             <a:r>
               <a:rPr lang="fr-FR" dirty="0"/>
@@ -4821,7 +4757,7 @@
             <a:hlinkClick r:id="rId2" action="ppaction://program"/>
             <a:extLst>
               <a:ext uri="{FF2B5EF4-FFF2-40B4-BE49-F238E27FC236}">
-                <a16:creationId xmlns:a16="http://schemas.microsoft.com/office/drawing/2014/main" xmlns="" id="{5D07DC50-91BF-4A42-B5AF-0D3DC4A229F5}"/>
+                <a16:creationId xmlns:a16="http://schemas.microsoft.com/office/drawing/2014/main" id="{5D07DC50-91BF-4A42-B5AF-0D3DC4A229F5}"/>
               </a:ext>
             </a:extLst>
           </p:cNvPr>
@@ -4894,7 +4830,7 @@
     </p:spTree>
     <p:extLst>
       <p:ext uri="{BB962C8B-B14F-4D97-AF65-F5344CB8AC3E}">
-        <p14:creationId xmlns:p14="http://schemas.microsoft.com/office/powerpoint/2010/main" xmlns="" val="3972719392"/>
+        <p14:creationId xmlns:p14="http://schemas.microsoft.com/office/powerpoint/2010/main" val="341270607"/>
       </p:ext>
     </p:extLst>
   </p:cSld>
@@ -4926,7 +4862,7 @@
           <p:cNvPr id="2" name="Titel 1">
             <a:extLst>
               <a:ext uri="{FF2B5EF4-FFF2-40B4-BE49-F238E27FC236}">
-                <a16:creationId xmlns:a16="http://schemas.microsoft.com/office/drawing/2014/main" xmlns="" id="{19DD5F15-9C27-4730-80B4-4B8CA5C3D954}"/>
+                <a16:creationId xmlns:a16="http://schemas.microsoft.com/office/drawing/2014/main" id="{19DD5F15-9C27-4730-80B4-4B8CA5C3D954}"/>
               </a:ext>
             </a:extLst>
           </p:cNvPr>
@@ -4944,13 +4880,8 @@
           <a:p>
             <a:r>
               <a:rPr lang="de-DE" dirty="0"/>
-              <a:t>Backup – Recorder </a:t>
-            </a:r>
-            <a:r>
-              <a:rPr lang="de-DE" dirty="0" err="1"/>
-              <a:t>Stop</a:t>
-            </a:r>
-            <a:endParaRPr lang="de-DE" dirty="0"/>
+              <a:t>Backup – Recorder Start</a:t>
+            </a:r>
           </a:p>
         </p:txBody>
       </p:sp>
@@ -4959,7 +4890,7 @@
           <p:cNvPr id="3" name="Inhaltsplatzhalter 2">
             <a:extLst>
               <a:ext uri="{FF2B5EF4-FFF2-40B4-BE49-F238E27FC236}">
-                <a16:creationId xmlns:a16="http://schemas.microsoft.com/office/drawing/2014/main" xmlns="" id="{E47621BA-2F32-4AB0-8C4C-5362CB4F4EC5}"/>
+                <a16:creationId xmlns:a16="http://schemas.microsoft.com/office/drawing/2014/main" id="{E47621BA-2F32-4AB0-8C4C-5362CB4F4EC5}"/>
               </a:ext>
             </a:extLst>
           </p:cNvPr>
@@ -4978,25 +4909,17 @@
         </p:spPr>
         <p:txBody>
           <a:bodyPr>
-            <a:normAutofit/>
+            <a:normAutofit fontScale="92500" lnSpcReduction="20000"/>
           </a:bodyPr>
           <a:lstStyle/>
           <a:p>
             <a:r>
-              <a:rPr lang="de-DE"/>
-              <a:t>stopps</a:t>
-            </a:r>
-            <a:r>
-              <a:rPr lang="de-DE" dirty="0"/>
-              <a:t> </a:t>
-            </a:r>
-            <a:r>
-              <a:rPr lang="de-DE" dirty="0" err="1"/>
-              <a:t>the</a:t>
-            </a:r>
-            <a:r>
-              <a:rPr lang="de-DE" dirty="0"/>
-              <a:t> </a:t>
+              <a:rPr lang="de-DE" dirty="0" err="1"/>
+              <a:t>starts</a:t>
+            </a:r>
+            <a:r>
+              <a:rPr lang="de-DE" dirty="0"/>
+              <a:t> the </a:t>
             </a:r>
             <a:r>
               <a:rPr lang="de-DE" dirty="0" err="1"/>
@@ -5013,6 +4936,96 @@
             <a:endParaRPr lang="de-DE" dirty="0"/>
           </a:p>
           <a:p>
+            <a:r>
+              <a:rPr lang="de-DE" dirty="0" err="1"/>
+              <a:t>only</a:t>
+            </a:r>
+            <a:r>
+              <a:rPr lang="de-DE" dirty="0"/>
+              <a:t> </a:t>
+            </a:r>
+            <a:r>
+              <a:rPr lang="de-DE" dirty="0" err="1"/>
+              <a:t>used</a:t>
+            </a:r>
+            <a:r>
+              <a:rPr lang="de-DE" dirty="0"/>
+              <a:t> </a:t>
+            </a:r>
+            <a:r>
+              <a:rPr lang="de-DE" dirty="0" err="1"/>
+              <a:t>for</a:t>
+            </a:r>
+            <a:r>
+              <a:rPr lang="de-DE" dirty="0"/>
+              <a:t> </a:t>
+            </a:r>
+            <a:r>
+              <a:rPr lang="de-DE" dirty="0" err="1"/>
+              <a:t>pre</a:t>
+            </a:r>
+            <a:r>
+              <a:rPr lang="de-DE" dirty="0"/>
+              <a:t> </a:t>
+            </a:r>
+            <a:r>
+              <a:rPr lang="de-DE" dirty="0" err="1"/>
+              <a:t>church</a:t>
+            </a:r>
+            <a:r>
+              <a:rPr lang="de-DE" dirty="0"/>
+              <a:t> check, the </a:t>
+            </a:r>
+            <a:r>
+              <a:rPr lang="de-DE" dirty="0" err="1"/>
+              <a:t>backup</a:t>
+            </a:r>
+            <a:r>
+              <a:rPr lang="de-DE" dirty="0"/>
+              <a:t> </a:t>
+            </a:r>
+            <a:r>
+              <a:rPr lang="de-DE" dirty="0" err="1"/>
+              <a:t>recorder</a:t>
+            </a:r>
+            <a:r>
+              <a:rPr lang="de-DE" dirty="0"/>
+              <a:t> </a:t>
+            </a:r>
+            <a:r>
+              <a:rPr lang="de-DE" dirty="0" err="1"/>
+              <a:t>starts</a:t>
+            </a:r>
+            <a:r>
+              <a:rPr lang="de-DE" dirty="0"/>
+              <a:t> </a:t>
+            </a:r>
+            <a:r>
+              <a:rPr lang="de-DE" dirty="0" err="1"/>
+              <a:t>with</a:t>
+            </a:r>
+            <a:r>
+              <a:rPr lang="de-DE" dirty="0"/>
+              <a:t> </a:t>
+            </a:r>
+            <a:r>
+              <a:rPr lang="de-DE" dirty="0" err="1"/>
+              <a:t>sequence</a:t>
+            </a:r>
+            <a:r>
+              <a:rPr lang="de-DE" dirty="0"/>
+              <a:t> </a:t>
+            </a:r>
+            <a:r>
+              <a:rPr lang="de-DE" dirty="0" err="1"/>
+              <a:t>Timer</a:t>
+            </a:r>
+            <a:endParaRPr lang="de-DE" dirty="0"/>
+          </a:p>
+          <a:p>
+            <a:endParaRPr lang="de-DE" dirty="0"/>
+          </a:p>
+          <a:p>
             <a:endParaRPr lang="de-DE" dirty="0"/>
           </a:p>
           <a:p>
@@ -5034,7 +5047,7 @@
                   <a:srgbClr val="FF0000"/>
                 </a:solidFill>
               </a:rPr>
-              <a:t>                                                                         RS</a:t>
+              <a:t>                                                                         RC</a:t>
             </a:r>
             <a:endParaRPr lang="de-DE" dirty="0"/>
           </a:p>
@@ -5054,7 +5067,7 @@
             </a:r>
             <a:r>
               <a:rPr lang="fr-FR" dirty="0" err="1"/>
-              <a:t>Backup_Stop</a:t>
+              <a:t>Backup_Start</a:t>
             </a:r>
             <a:r>
               <a:rPr lang="fr-FR" dirty="0"/>
@@ -5070,7 +5083,7 @@
             <a:hlinkClick r:id="rId2" action="ppaction://program"/>
             <a:extLst>
               <a:ext uri="{FF2B5EF4-FFF2-40B4-BE49-F238E27FC236}">
-                <a16:creationId xmlns:a16="http://schemas.microsoft.com/office/drawing/2014/main" xmlns="" id="{5D07DC50-91BF-4A42-B5AF-0D3DC4A229F5}"/>
+                <a16:creationId xmlns:a16="http://schemas.microsoft.com/office/drawing/2014/main" id="{5D07DC50-91BF-4A42-B5AF-0D3DC4A229F5}"/>
               </a:ext>
             </a:extLst>
           </p:cNvPr>
@@ -5143,7 +5156,7 @@
     </p:spTree>
     <p:extLst>
       <p:ext uri="{BB962C8B-B14F-4D97-AF65-F5344CB8AC3E}">
-        <p14:creationId xmlns:p14="http://schemas.microsoft.com/office/powerpoint/2010/main" xmlns="" val="3972719392"/>
+        <p14:creationId xmlns:p14="http://schemas.microsoft.com/office/powerpoint/2010/main" val="3972719392"/>
       </p:ext>
     </p:extLst>
   </p:cSld>
@@ -5175,7 +5188,7 @@
           <p:cNvPr id="2" name="Titel 1">
             <a:extLst>
               <a:ext uri="{FF2B5EF4-FFF2-40B4-BE49-F238E27FC236}">
-                <a16:creationId xmlns:a16="http://schemas.microsoft.com/office/drawing/2014/main" xmlns="" id="{19DD5F15-9C27-4730-80B4-4B8CA5C3D954}"/>
+                <a16:creationId xmlns:a16="http://schemas.microsoft.com/office/drawing/2014/main" id="{19DD5F15-9C27-4730-80B4-4B8CA5C3D954}"/>
               </a:ext>
             </a:extLst>
           </p:cNvPr>
@@ -5192,16 +5205,12 @@
           <a:lstStyle/>
           <a:p>
             <a:r>
-              <a:rPr lang="de-DE" dirty="0" err="1"/>
-              <a:t>Raspberry</a:t>
-            </a:r>
-            <a:r>
-              <a:rPr lang="de-DE" dirty="0"/>
-              <a:t> Pi – </a:t>
-            </a:r>
-            <a:r>
-              <a:rPr lang="de-DE" dirty="0" err="1"/>
-              <a:t>Reset</a:t>
+              <a:rPr lang="de-DE" dirty="0"/>
+              <a:t>Backup – Recorder </a:t>
+            </a:r>
+            <a:r>
+              <a:rPr lang="de-DE" dirty="0" err="1"/>
+              <a:t>Stop</a:t>
             </a:r>
             <a:endParaRPr lang="de-DE" dirty="0"/>
           </a:p>
@@ -5212,7 +5221,7 @@
           <p:cNvPr id="3" name="Inhaltsplatzhalter 2">
             <a:extLst>
               <a:ext uri="{FF2B5EF4-FFF2-40B4-BE49-F238E27FC236}">
-                <a16:creationId xmlns:a16="http://schemas.microsoft.com/office/drawing/2014/main" xmlns="" id="{E47621BA-2F32-4AB0-8C4C-5362CB4F4EC5}"/>
+                <a16:creationId xmlns:a16="http://schemas.microsoft.com/office/drawing/2014/main" id="{E47621BA-2F32-4AB0-8C4C-5362CB4F4EC5}"/>
               </a:ext>
             </a:extLst>
           </p:cNvPr>
@@ -5231,92 +5240,39 @@
         </p:spPr>
         <p:txBody>
           <a:bodyPr>
-            <a:normAutofit lnSpcReduction="10000"/>
+            <a:normAutofit/>
           </a:bodyPr>
           <a:lstStyle/>
           <a:p>
             <a:r>
-              <a:rPr lang="de-DE" dirty="0" err="1"/>
-              <a:t>kills</a:t>
-            </a:r>
-            <a:r>
-              <a:rPr lang="de-DE" dirty="0"/>
-              <a:t> all </a:t>
-            </a:r>
-            <a:r>
-              <a:rPr lang="de-DE" dirty="0" err="1"/>
-              <a:t>RasPiAutomation</a:t>
-            </a:r>
-            <a:r>
-              <a:rPr lang="de-DE" dirty="0"/>
-              <a:t> </a:t>
-            </a:r>
-            <a:r>
-              <a:rPr lang="de-DE" dirty="0" err="1"/>
-              <a:t>processes</a:t>
-            </a:r>
-            <a:r>
-              <a:rPr lang="de-DE" dirty="0"/>
-              <a:t> </a:t>
-            </a:r>
-            <a:r>
-              <a:rPr lang="de-DE" dirty="0" err="1"/>
-              <a:t>at</a:t>
-            </a:r>
-            <a:r>
-              <a:rPr lang="de-DE" dirty="0"/>
-              <a:t> </a:t>
-            </a:r>
-            <a:r>
-              <a:rPr lang="de-DE" dirty="0" err="1"/>
-              <a:t>Raspberry</a:t>
-            </a:r>
-            <a:r>
-              <a:rPr lang="de-DE" dirty="0"/>
-              <a:t> Pi</a:t>
-            </a:r>
-          </a:p>
-          <a:p>
-            <a:r>
-              <a:rPr lang="de-DE" dirty="0" err="1"/>
-              <a:t>only</a:t>
-            </a:r>
-            <a:r>
-              <a:rPr lang="de-DE" dirty="0"/>
-              <a:t> </a:t>
-            </a:r>
-            <a:r>
-              <a:rPr lang="de-DE" dirty="0" err="1"/>
-              <a:t>used</a:t>
-            </a:r>
-            <a:r>
-              <a:rPr lang="de-DE" dirty="0"/>
-              <a:t> </a:t>
-            </a:r>
-            <a:r>
-              <a:rPr lang="de-DE" dirty="0" err="1"/>
-              <a:t>for</a:t>
-            </a:r>
-            <a:r>
-              <a:rPr lang="de-DE" dirty="0"/>
-              <a:t> </a:t>
-            </a:r>
-            <a:r>
-              <a:rPr lang="de-DE" dirty="0" err="1"/>
-              <a:t>pre</a:t>
-            </a:r>
-            <a:r>
-              <a:rPr lang="de-DE" dirty="0"/>
-              <a:t> </a:t>
-            </a:r>
-            <a:r>
-              <a:rPr lang="de-DE" dirty="0" err="1"/>
-              <a:t>church</a:t>
-            </a:r>
-            <a:r>
-              <a:rPr lang="de-DE" dirty="0"/>
-              <a:t> check</a:t>
-            </a:r>
+              <a:rPr lang="de-DE"/>
+              <a:t>stopps</a:t>
+            </a:r>
+            <a:r>
+              <a:rPr lang="de-DE" dirty="0"/>
+              <a:t> </a:t>
+            </a:r>
+            <a:r>
+              <a:rPr lang="de-DE" dirty="0" err="1"/>
+              <a:t>the</a:t>
+            </a:r>
+            <a:r>
+              <a:rPr lang="de-DE" dirty="0"/>
+              <a:t> </a:t>
+            </a:r>
+            <a:r>
+              <a:rPr lang="de-DE" dirty="0" err="1"/>
+              <a:t>backup</a:t>
+            </a:r>
+            <a:r>
+              <a:rPr lang="de-DE" dirty="0"/>
+              <a:t> </a:t>
+            </a:r>
+            <a:r>
+              <a:rPr lang="de-DE" dirty="0" err="1"/>
+              <a:t>recorder</a:t>
+            </a:r>
+            <a:endParaRPr lang="de-DE" dirty="0"/>
           </a:p>
           <a:p>
             <a:endParaRPr lang="de-DE" dirty="0"/>
@@ -5340,7 +5296,7 @@
                   <a:srgbClr val="FF0000"/>
                 </a:solidFill>
               </a:rPr>
-              <a:t>                                                                         RR</a:t>
+              <a:t>                                                                         RS</a:t>
             </a:r>
             <a:endParaRPr lang="de-DE" dirty="0"/>
           </a:p>
@@ -5359,8 +5315,8 @@
               <a:t>JokiAutomation.exe "</a:t>
             </a:r>
             <a:r>
-              <a:rPr lang="de-DE" dirty="0" err="1"/>
-              <a:t>RasPi_Reset</a:t>
+              <a:rPr lang="fr-FR" dirty="0" err="1"/>
+              <a:t>Backup_Stop</a:t>
             </a:r>
             <a:r>
               <a:rPr lang="fr-FR" dirty="0"/>
@@ -5376,7 +5332,7 @@
             <a:hlinkClick r:id="rId2" action="ppaction://program"/>
             <a:extLst>
               <a:ext uri="{FF2B5EF4-FFF2-40B4-BE49-F238E27FC236}">
-                <a16:creationId xmlns:a16="http://schemas.microsoft.com/office/drawing/2014/main" xmlns="" id="{5D07DC50-91BF-4A42-B5AF-0D3DC4A229F5}"/>
+                <a16:creationId xmlns:a16="http://schemas.microsoft.com/office/drawing/2014/main" id="{5D07DC50-91BF-4A42-B5AF-0D3DC4A229F5}"/>
               </a:ext>
             </a:extLst>
           </p:cNvPr>
@@ -5449,7 +5405,7 @@
     </p:spTree>
     <p:extLst>
       <p:ext uri="{BB962C8B-B14F-4D97-AF65-F5344CB8AC3E}">
-        <p14:creationId xmlns:p14="http://schemas.microsoft.com/office/powerpoint/2010/main" xmlns="" val="3972719392"/>
+        <p14:creationId xmlns:p14="http://schemas.microsoft.com/office/powerpoint/2010/main" val="3972719392"/>
       </p:ext>
     </p:extLst>
   </p:cSld>
@@ -5481,7 +5437,7 @@
           <p:cNvPr id="2" name="Titel 1">
             <a:extLst>
               <a:ext uri="{FF2B5EF4-FFF2-40B4-BE49-F238E27FC236}">
-                <a16:creationId xmlns:a16="http://schemas.microsoft.com/office/drawing/2014/main" xmlns="" id="{19DD5F15-9C27-4730-80B4-4B8CA5C3D954}"/>
+                <a16:creationId xmlns:a16="http://schemas.microsoft.com/office/drawing/2014/main" id="{19DD5F15-9C27-4730-80B4-4B8CA5C3D954}"/>
               </a:ext>
             </a:extLst>
           </p:cNvPr>
@@ -5498,18 +5454,9 @@
           <a:lstStyle/>
           <a:p>
             <a:r>
-              <a:rPr lang="de-DE" dirty="0" err="1"/>
-              <a:t>shut</a:t>
-            </a:r>
-            <a:r>
-              <a:rPr lang="de-DE" dirty="0"/>
-              <a:t> down </a:t>
-            </a:r>
-            <a:r>
-              <a:rPr lang="de-DE" dirty="0" err="1"/>
-              <a:t>sequence</a:t>
-            </a:r>
-            <a:endParaRPr lang="de-DE" dirty="0"/>
+              <a:rPr lang="de-DE" dirty="0"/>
+              <a:t>Backup – Recorder Power on / off</a:t>
+            </a:r>
           </a:p>
         </p:txBody>
       </p:sp>
@@ -5518,7 +5465,7 @@
           <p:cNvPr id="3" name="Inhaltsplatzhalter 2">
             <a:extLst>
               <a:ext uri="{FF2B5EF4-FFF2-40B4-BE49-F238E27FC236}">
-                <a16:creationId xmlns:a16="http://schemas.microsoft.com/office/drawing/2014/main" xmlns="" id="{E47621BA-2F32-4AB0-8C4C-5362CB4F4EC5}"/>
+                <a16:creationId xmlns:a16="http://schemas.microsoft.com/office/drawing/2014/main" id="{E47621BA-2F32-4AB0-8C4C-5362CB4F4EC5}"/>
               </a:ext>
             </a:extLst>
           </p:cNvPr>
@@ -5537,43 +5484,13 @@
         </p:spPr>
         <p:txBody>
           <a:bodyPr>
-            <a:normAutofit fontScale="92500" lnSpcReduction="10000"/>
+            <a:normAutofit lnSpcReduction="10000"/>
           </a:bodyPr>
           <a:lstStyle/>
           <a:p>
             <a:r>
-              <a:rPr lang="de-DE" dirty="0" err="1"/>
-              <a:t>Stop</a:t>
-            </a:r>
-            <a:r>
-              <a:rPr lang="de-DE" dirty="0"/>
-              <a:t> Backup Recorder</a:t>
-            </a:r>
-          </a:p>
-          <a:p>
-            <a:r>
-              <a:rPr lang="de-DE" dirty="0"/>
-              <a:t>Switch off </a:t>
-            </a:r>
-            <a:r>
-              <a:rPr lang="de-DE" dirty="0" err="1"/>
-              <a:t>Beamer</a:t>
-            </a:r>
-            <a:r>
-              <a:rPr lang="de-DE" dirty="0"/>
-              <a:t> </a:t>
-            </a:r>
-          </a:p>
-          <a:p>
-            <a:r>
-              <a:rPr lang="de-DE" dirty="0"/>
-              <a:t>Switch off HDMI switch</a:t>
-            </a:r>
-          </a:p>
-          <a:p>
-            <a:r>
-              <a:rPr lang="de-DE" dirty="0"/>
-              <a:t>Switch off </a:t>
+              <a:rPr lang="de-DE" dirty="0"/>
+              <a:t>Switch on / off </a:t>
             </a:r>
             <a:r>
               <a:rPr lang="de-DE" dirty="0" err="1"/>
@@ -5592,63 +5509,80 @@
           <a:p>
             <a:r>
               <a:rPr lang="de-DE" dirty="0" err="1"/>
-              <a:t>Shut</a:t>
-            </a:r>
-            <a:r>
-              <a:rPr lang="de-DE" dirty="0"/>
-              <a:t> down </a:t>
-            </a:r>
-            <a:r>
-              <a:rPr lang="de-DE" dirty="0" err="1"/>
-              <a:t>raspberry</a:t>
-            </a:r>
-            <a:r>
-              <a:rPr lang="de-DE" dirty="0"/>
-              <a:t> </a:t>
-            </a:r>
-            <a:r>
-              <a:rPr lang="de-DE" dirty="0" err="1"/>
-              <a:t>pi</a:t>
-            </a:r>
+              <a:t>Only</a:t>
+            </a:r>
+            <a:r>
+              <a:rPr lang="de-DE" dirty="0"/>
+              <a:t> </a:t>
+            </a:r>
+            <a:r>
+              <a:rPr lang="de-DE" dirty="0" err="1"/>
+              <a:t>used</a:t>
+            </a:r>
+            <a:r>
+              <a:rPr lang="de-DE" dirty="0"/>
+              <a:t> on </a:t>
+            </a:r>
+            <a:r>
+              <a:rPr lang="de-DE" dirty="0" err="1"/>
+              <a:t>pre</a:t>
+            </a:r>
+            <a:r>
+              <a:rPr lang="de-DE" dirty="0"/>
+              <a:t> </a:t>
+            </a:r>
+            <a:r>
+              <a:rPr lang="de-DE" dirty="0" err="1"/>
+              <a:t>church</a:t>
+            </a:r>
+            <a:r>
+              <a:rPr lang="de-DE" dirty="0"/>
+              <a:t> check</a:t>
+            </a:r>
+          </a:p>
+          <a:p>
+            <a:endParaRPr lang="de-DE" dirty="0"/>
+          </a:p>
+          <a:p>
+            <a:endParaRPr lang="de-DE" dirty="0"/>
+          </a:p>
+          <a:p>
+            <a:endParaRPr lang="de-DE" dirty="0"/>
+          </a:p>
+          <a:p>
             <a:endParaRPr lang="de-DE" dirty="0"/>
           </a:p>
           <a:p>
             <a:pPr marL="0" indent="0">
               <a:buNone/>
             </a:pPr>
+            <a:r>
+              <a:rPr lang="de-DE" dirty="0">
+                <a:solidFill>
+                  <a:srgbClr val="FF0000"/>
+                </a:solidFill>
+              </a:rPr>
+              <a:t>                                                                         RP</a:t>
+            </a:r>
             <a:endParaRPr lang="de-DE" dirty="0"/>
           </a:p>
           <a:p>
             <a:pPr marL="0" indent="0">
               <a:buNone/>
             </a:pPr>
-            <a:r>
-              <a:rPr lang="de-DE" sz="4300" b="1" dirty="0">
-                <a:solidFill>
-                  <a:srgbClr val="FF0000"/>
-                </a:solidFill>
-              </a:rPr>
-              <a:t>                                              Ausschaltsequenz!!!</a:t>
-            </a:r>
-            <a:endParaRPr lang="de-DE" sz="4300" b="1" dirty="0"/>
+            <a:endParaRPr lang="de-DE" dirty="0"/>
           </a:p>
           <a:p>
             <a:pPr marL="0" indent="0">
               <a:buNone/>
             </a:pPr>
-            <a:endParaRPr lang="de-DE" dirty="0"/>
-          </a:p>
-          <a:p>
-            <a:pPr marL="0" indent="0">
-              <a:buNone/>
-            </a:pPr>
             <a:r>
               <a:rPr lang="fr-FR" dirty="0"/>
-              <a:t>JokiAutomation.exe  "</a:t>
+              <a:t>JokiAutomation.exe "</a:t>
             </a:r>
             <a:r>
               <a:rPr lang="fr-FR" dirty="0" err="1"/>
-              <a:t>Ausschaltsequenz</a:t>
+              <a:t>Backup_Switch</a:t>
             </a:r>
             <a:r>
               <a:rPr lang="fr-FR" dirty="0"/>
@@ -5664,7 +5598,7 @@
             <a:hlinkClick r:id="rId2" action="ppaction://program"/>
             <a:extLst>
               <a:ext uri="{FF2B5EF4-FFF2-40B4-BE49-F238E27FC236}">
-                <a16:creationId xmlns:a16="http://schemas.microsoft.com/office/drawing/2014/main" xmlns="" id="{5D07DC50-91BF-4A42-B5AF-0D3DC4A229F5}"/>
+                <a16:creationId xmlns:a16="http://schemas.microsoft.com/office/drawing/2014/main" id="{5D07DC50-91BF-4A42-B5AF-0D3DC4A229F5}"/>
               </a:ext>
             </a:extLst>
           </p:cNvPr>
@@ -5673,7 +5607,7 @@
         </p:nvSpPr>
         <p:spPr>
           <a:xfrm>
-            <a:off x="5349765" y="3867807"/>
+            <a:off x="5307724" y="3983420"/>
             <a:ext cx="1492469" cy="693683"/>
           </a:xfrm>
           <a:prstGeom prst="rightArrow">
@@ -5737,7 +5671,7 @@
     </p:spTree>
     <p:extLst>
       <p:ext uri="{BB962C8B-B14F-4D97-AF65-F5344CB8AC3E}">
-        <p14:creationId xmlns:p14="http://schemas.microsoft.com/office/powerpoint/2010/main" xmlns="" val="3348951714"/>
+        <p14:creationId xmlns:p14="http://schemas.microsoft.com/office/powerpoint/2010/main" val="2507729401"/>
       </p:ext>
     </p:extLst>
   </p:cSld>
@@ -5769,7 +5703,7 @@
           <p:cNvPr id="2" name="Titel 1">
             <a:extLst>
               <a:ext uri="{FF2B5EF4-FFF2-40B4-BE49-F238E27FC236}">
-                <a16:creationId xmlns:a16="http://schemas.microsoft.com/office/drawing/2014/main" xmlns="" id="{19DD5F15-9C27-4730-80B4-4B8CA5C3D954}"/>
+                <a16:creationId xmlns:a16="http://schemas.microsoft.com/office/drawing/2014/main" id="{19DD5F15-9C27-4730-80B4-4B8CA5C3D954}"/>
               </a:ext>
             </a:extLst>
           </p:cNvPr>
@@ -5786,12 +5720,16 @@
           <a:lstStyle/>
           <a:p>
             <a:r>
-              <a:rPr lang="de-DE" dirty="0"/>
-              <a:t>Position Control Camcorder Move </a:t>
-            </a:r>
-            <a:r>
-              <a:rPr lang="de-DE" dirty="0" err="1"/>
-              <a:t>Sequence</a:t>
+              <a:rPr lang="de-DE" dirty="0" err="1"/>
+              <a:t>Raspberry</a:t>
+            </a:r>
+            <a:r>
+              <a:rPr lang="de-DE" dirty="0"/>
+              <a:t> Pi – </a:t>
+            </a:r>
+            <a:r>
+              <a:rPr lang="de-DE" dirty="0" err="1"/>
+              <a:t>Reset</a:t>
             </a:r>
             <a:endParaRPr lang="de-DE" dirty="0"/>
           </a:p>
@@ -5802,7 +5740,870 @@
           <p:cNvPr id="3" name="Inhaltsplatzhalter 2">
             <a:extLst>
               <a:ext uri="{FF2B5EF4-FFF2-40B4-BE49-F238E27FC236}">
-                <a16:creationId xmlns:a16="http://schemas.microsoft.com/office/drawing/2014/main" xmlns="" id="{E47621BA-2F32-4AB0-8C4C-5362CB4F4EC5}"/>
+                <a16:creationId xmlns:a16="http://schemas.microsoft.com/office/drawing/2014/main" id="{E47621BA-2F32-4AB0-8C4C-5362CB4F4EC5}"/>
+              </a:ext>
+            </a:extLst>
+          </p:cNvPr>
+          <p:cNvSpPr>
+            <a:spLocks noGrp="1"/>
+          </p:cNvSpPr>
+          <p:nvPr>
+            <p:ph idx="1"/>
+          </p:nvPr>
+        </p:nvSpPr>
+        <p:spPr>
+          <a:xfrm>
+            <a:off x="838200" y="1807751"/>
+            <a:ext cx="10515600" cy="4351338"/>
+          </a:xfrm>
+        </p:spPr>
+        <p:txBody>
+          <a:bodyPr>
+            <a:normAutofit lnSpcReduction="10000"/>
+          </a:bodyPr>
+          <a:lstStyle/>
+          <a:p>
+            <a:r>
+              <a:rPr lang="de-DE" dirty="0" err="1"/>
+              <a:t>kills</a:t>
+            </a:r>
+            <a:r>
+              <a:rPr lang="de-DE" dirty="0"/>
+              <a:t> all </a:t>
+            </a:r>
+            <a:r>
+              <a:rPr lang="de-DE" dirty="0" err="1"/>
+              <a:t>RasPiAutomation</a:t>
+            </a:r>
+            <a:r>
+              <a:rPr lang="de-DE" dirty="0"/>
+              <a:t> </a:t>
+            </a:r>
+            <a:r>
+              <a:rPr lang="de-DE" dirty="0" err="1"/>
+              <a:t>processes</a:t>
+            </a:r>
+            <a:r>
+              <a:rPr lang="de-DE" dirty="0"/>
+              <a:t> </a:t>
+            </a:r>
+            <a:r>
+              <a:rPr lang="de-DE" dirty="0" err="1"/>
+              <a:t>at</a:t>
+            </a:r>
+            <a:r>
+              <a:rPr lang="de-DE" dirty="0"/>
+              <a:t> </a:t>
+            </a:r>
+            <a:r>
+              <a:rPr lang="de-DE" dirty="0" err="1"/>
+              <a:t>Raspberry</a:t>
+            </a:r>
+            <a:r>
+              <a:rPr lang="de-DE" dirty="0"/>
+              <a:t> Pi</a:t>
+            </a:r>
+          </a:p>
+          <a:p>
+            <a:r>
+              <a:rPr lang="de-DE" dirty="0" err="1"/>
+              <a:t>only</a:t>
+            </a:r>
+            <a:r>
+              <a:rPr lang="de-DE" dirty="0"/>
+              <a:t> </a:t>
+            </a:r>
+            <a:r>
+              <a:rPr lang="de-DE" dirty="0" err="1"/>
+              <a:t>used</a:t>
+            </a:r>
+            <a:r>
+              <a:rPr lang="de-DE" dirty="0"/>
+              <a:t> </a:t>
+            </a:r>
+            <a:r>
+              <a:rPr lang="de-DE" dirty="0" err="1"/>
+              <a:t>for</a:t>
+            </a:r>
+            <a:r>
+              <a:rPr lang="de-DE" dirty="0"/>
+              <a:t> </a:t>
+            </a:r>
+            <a:r>
+              <a:rPr lang="de-DE" dirty="0" err="1"/>
+              <a:t>pre</a:t>
+            </a:r>
+            <a:r>
+              <a:rPr lang="de-DE" dirty="0"/>
+              <a:t> </a:t>
+            </a:r>
+            <a:r>
+              <a:rPr lang="de-DE" dirty="0" err="1"/>
+              <a:t>church</a:t>
+            </a:r>
+            <a:r>
+              <a:rPr lang="de-DE" dirty="0"/>
+              <a:t> check</a:t>
+            </a:r>
+          </a:p>
+          <a:p>
+            <a:endParaRPr lang="de-DE" dirty="0"/>
+          </a:p>
+          <a:p>
+            <a:endParaRPr lang="de-DE" dirty="0"/>
+          </a:p>
+          <a:p>
+            <a:endParaRPr lang="de-DE" dirty="0"/>
+          </a:p>
+          <a:p>
+            <a:endParaRPr lang="de-DE" dirty="0"/>
+          </a:p>
+          <a:p>
+            <a:pPr marL="0" indent="0">
+              <a:buNone/>
+            </a:pPr>
+            <a:r>
+              <a:rPr lang="de-DE" dirty="0">
+                <a:solidFill>
+                  <a:srgbClr val="FF0000"/>
+                </a:solidFill>
+              </a:rPr>
+              <a:t>                                                                         RR</a:t>
+            </a:r>
+            <a:endParaRPr lang="de-DE" dirty="0"/>
+          </a:p>
+          <a:p>
+            <a:pPr marL="0" indent="0">
+              <a:buNone/>
+            </a:pPr>
+            <a:endParaRPr lang="de-DE" dirty="0"/>
+          </a:p>
+          <a:p>
+            <a:pPr marL="0" indent="0">
+              <a:buNone/>
+            </a:pPr>
+            <a:r>
+              <a:rPr lang="fr-FR" dirty="0"/>
+              <a:t>JokiAutomation.exe "</a:t>
+            </a:r>
+            <a:r>
+              <a:rPr lang="de-DE" dirty="0" err="1"/>
+              <a:t>RasPi_Reset</a:t>
+            </a:r>
+            <a:r>
+              <a:rPr lang="fr-FR" dirty="0"/>
+              <a:t>"</a:t>
+            </a:r>
+            <a:endParaRPr lang="de-DE" dirty="0"/>
+          </a:p>
+        </p:txBody>
+      </p:sp>
+      <p:sp>
+        <p:nvSpPr>
+          <p:cNvPr id="4" name="Pfeil: nach rechts 3">
+            <a:hlinkClick r:id="rId2" action="ppaction://program"/>
+            <a:extLst>
+              <a:ext uri="{FF2B5EF4-FFF2-40B4-BE49-F238E27FC236}">
+                <a16:creationId xmlns:a16="http://schemas.microsoft.com/office/drawing/2014/main" id="{5D07DC50-91BF-4A42-B5AF-0D3DC4A229F5}"/>
+              </a:ext>
+            </a:extLst>
+          </p:cNvPr>
+          <p:cNvSpPr/>
+          <p:nvPr/>
+        </p:nvSpPr>
+        <p:spPr>
+          <a:xfrm>
+            <a:off x="5307724" y="3983420"/>
+            <a:ext cx="1492469" cy="693683"/>
+          </a:xfrm>
+          <a:prstGeom prst="rightArrow">
+            <a:avLst/>
+          </a:prstGeom>
+        </p:spPr>
+        <p:style>
+          <a:lnRef idx="2">
+            <a:schemeClr val="accent1">
+              <a:shade val="50000"/>
+            </a:schemeClr>
+          </a:lnRef>
+          <a:fillRef idx="1">
+            <a:schemeClr val="accent1"/>
+          </a:fillRef>
+          <a:effectRef idx="0">
+            <a:schemeClr val="accent1"/>
+          </a:effectRef>
+          <a:fontRef idx="minor">
+            <a:schemeClr val="lt1"/>
+          </a:fontRef>
+        </p:style>
+        <p:txBody>
+          <a:bodyPr rtlCol="0" anchor="ctr"/>
+          <a:lstStyle/>
+          <a:p>
+            <a:pPr marL="0" marR="0" lvl="0" indent="0" algn="ctr" defTabSz="457200" rtl="0" eaLnBrk="1" fontAlgn="auto" latinLnBrk="0" hangingPunct="1">
+              <a:lnSpc>
+                <a:spcPct val="100000"/>
+              </a:lnSpc>
+              <a:spcBef>
+                <a:spcPts val="0"/>
+              </a:spcBef>
+              <a:spcAft>
+                <a:spcPts val="0"/>
+              </a:spcAft>
+              <a:buClrTx/>
+              <a:buSzTx/>
+              <a:buFontTx/>
+              <a:buNone/>
+              <a:tabLst/>
+              <a:defRPr/>
+            </a:pPr>
+            <a:endParaRPr kumimoji="0" lang="de-DE" sz="1800" b="0" i="0" u="none" strike="noStrike" kern="1200" cap="none" spc="0" normalizeH="0" baseline="0" noProof="0" dirty="0">
+              <a:ln>
+                <a:noFill/>
+              </a:ln>
+              <a:solidFill>
+                <a:prstClr val="white"/>
+              </a:solidFill>
+              <a:effectLst/>
+              <a:uLnTx/>
+              <a:uFillTx/>
+              <a:latin typeface="Calibri"/>
+              <a:ea typeface="+mn-ea"/>
+              <a:cs typeface="+mn-cs"/>
+            </a:endParaRPr>
+          </a:p>
+        </p:txBody>
+      </p:sp>
+    </p:spTree>
+    <p:extLst>
+      <p:ext uri="{BB962C8B-B14F-4D97-AF65-F5344CB8AC3E}">
+        <p14:creationId xmlns:p14="http://schemas.microsoft.com/office/powerpoint/2010/main" val="3972719392"/>
+      </p:ext>
+    </p:extLst>
+  </p:cSld>
+  <p:clrMapOvr>
+    <a:masterClrMapping/>
+  </p:clrMapOvr>
+</p:sld>
+</file>
+
+<file path=ppt/slides/slide2.xml><?xml version="1.0" encoding="utf-8"?>
+<p:sld xmlns:a="http://schemas.openxmlformats.org/drawingml/2006/main" xmlns:r="http://schemas.openxmlformats.org/officeDocument/2006/relationships" xmlns:p="http://schemas.openxmlformats.org/presentationml/2006/main">
+  <p:cSld>
+    <p:spTree>
+      <p:nvGrpSpPr>
+        <p:cNvPr id="1" name=""/>
+        <p:cNvGrpSpPr/>
+        <p:nvPr/>
+      </p:nvGrpSpPr>
+      <p:grpSpPr>
+        <a:xfrm>
+          <a:off x="0" y="0"/>
+          <a:ext cx="0" cy="0"/>
+          <a:chOff x="0" y="0"/>
+          <a:chExt cx="0" cy="0"/>
+        </a:xfrm>
+      </p:grpSpPr>
+      <p:sp>
+        <p:nvSpPr>
+          <p:cNvPr id="2" name="Titel 1">
+            <a:extLst>
+              <a:ext uri="{FF2B5EF4-FFF2-40B4-BE49-F238E27FC236}">
+                <a16:creationId xmlns:a16="http://schemas.microsoft.com/office/drawing/2014/main" id="{19DD5F15-9C27-4730-80B4-4B8CA5C3D954}"/>
+              </a:ext>
+            </a:extLst>
+          </p:cNvPr>
+          <p:cNvSpPr>
+            <a:spLocks noGrp="1"/>
+          </p:cNvSpPr>
+          <p:nvPr>
+            <p:ph type="title"/>
+          </p:nvPr>
+        </p:nvSpPr>
+        <p:spPr/>
+        <p:txBody>
+          <a:bodyPr/>
+          <a:lstStyle/>
+          <a:p>
+            <a:r>
+              <a:rPr lang="de-DE" dirty="0" err="1"/>
+              <a:t>Eventtimer</a:t>
+            </a:r>
+            <a:r>
+              <a:rPr lang="de-DE" dirty="0"/>
+              <a:t> Pause Text 1  Text 2</a:t>
+            </a:r>
+          </a:p>
+        </p:txBody>
+      </p:sp>
+      <p:sp>
+        <p:nvSpPr>
+          <p:cNvPr id="3" name="Inhaltsplatzhalter 2">
+            <a:extLst>
+              <a:ext uri="{FF2B5EF4-FFF2-40B4-BE49-F238E27FC236}">
+                <a16:creationId xmlns:a16="http://schemas.microsoft.com/office/drawing/2014/main" id="{E47621BA-2F32-4AB0-8C4C-5362CB4F4EC5}"/>
+              </a:ext>
+            </a:extLst>
+          </p:cNvPr>
+          <p:cNvSpPr>
+            <a:spLocks noGrp="1"/>
+          </p:cNvSpPr>
+          <p:nvPr>
+            <p:ph idx="1"/>
+          </p:nvPr>
+        </p:nvSpPr>
+        <p:spPr>
+          <a:xfrm>
+            <a:off x="838200" y="1807751"/>
+            <a:ext cx="10515600" cy="4351338"/>
+          </a:xfrm>
+        </p:spPr>
+        <p:txBody>
+          <a:bodyPr>
+            <a:normAutofit lnSpcReduction="10000"/>
+          </a:bodyPr>
+          <a:lstStyle/>
+          <a:p>
+            <a:r>
+              <a:rPr lang="de-DE" dirty="0" err="1"/>
+              <a:t>Beamer</a:t>
+            </a:r>
+            <a:r>
+              <a:rPr lang="de-DE" dirty="0"/>
+              <a:t> HDMI 1 (PPP </a:t>
+            </a:r>
+            <a:r>
+              <a:rPr lang="de-DE" dirty="0" err="1"/>
+              <a:t>view</a:t>
+            </a:r>
+            <a:r>
+              <a:rPr lang="de-DE" dirty="0"/>
+              <a:t>)</a:t>
+            </a:r>
+          </a:p>
+          <a:p>
+            <a:r>
+              <a:rPr lang="de-DE" dirty="0"/>
+              <a:t>Audio Mix </a:t>
+            </a:r>
+            <a:r>
+              <a:rPr lang="de-DE" dirty="0" err="1"/>
+              <a:t>Reset</a:t>
+            </a:r>
+            <a:r>
+              <a:rPr lang="de-DE" dirty="0"/>
+              <a:t> and </a:t>
+            </a:r>
+            <a:r>
+              <a:rPr lang="de-DE" dirty="0" err="1"/>
+              <a:t>then</a:t>
+            </a:r>
+            <a:r>
+              <a:rPr lang="de-DE" dirty="0"/>
+              <a:t> </a:t>
+            </a:r>
+            <a:r>
+              <a:rPr lang="de-DE" dirty="0" err="1"/>
+              <a:t>switched</a:t>
+            </a:r>
+            <a:r>
+              <a:rPr lang="de-DE" dirty="0"/>
+              <a:t> </a:t>
+            </a:r>
+            <a:r>
+              <a:rPr lang="de-DE" dirty="0" err="1"/>
+              <a:t>to</a:t>
+            </a:r>
+            <a:r>
+              <a:rPr lang="de-DE" dirty="0"/>
+              <a:t> Profile ‚Diashow‘</a:t>
+            </a:r>
+          </a:p>
+          <a:p>
+            <a:r>
+              <a:rPr lang="de-DE" dirty="0"/>
+              <a:t>HDMI Switch </a:t>
+            </a:r>
+            <a:r>
+              <a:rPr lang="de-DE" dirty="0" err="1"/>
+              <a:t>channel</a:t>
+            </a:r>
+            <a:r>
+              <a:rPr lang="de-DE" dirty="0"/>
+              <a:t> 1 (Laptop PPP)</a:t>
+            </a:r>
+          </a:p>
+          <a:p>
+            <a:r>
+              <a:rPr lang="de-DE" dirty="0" err="1"/>
+              <a:t>Slidershow</a:t>
+            </a:r>
+            <a:r>
+              <a:rPr lang="de-DE" dirty="0"/>
+              <a:t> + Pause, Text 1 and Text 2</a:t>
+            </a:r>
+          </a:p>
+          <a:p>
+            <a:endParaRPr lang="de-DE" dirty="0"/>
+          </a:p>
+          <a:p>
+            <a:pPr marL="0" indent="0">
+              <a:buNone/>
+            </a:pPr>
+            <a:r>
+              <a:rPr lang="de-DE" dirty="0"/>
+              <a:t>                                                                                </a:t>
+            </a:r>
+            <a:r>
+              <a:rPr lang="de-DE" dirty="0">
+                <a:solidFill>
+                  <a:srgbClr val="FF0000"/>
+                </a:solidFill>
+              </a:rPr>
+              <a:t>P</a:t>
+            </a:r>
+          </a:p>
+          <a:p>
+            <a:pPr marL="0" indent="0">
+              <a:buNone/>
+            </a:pPr>
+            <a:endParaRPr lang="de-DE" dirty="0"/>
+          </a:p>
+          <a:p>
+            <a:endParaRPr lang="de-DE" dirty="0"/>
+          </a:p>
+          <a:p>
+            <a:pPr marL="0" indent="0">
+              <a:buNone/>
+            </a:pPr>
+            <a:r>
+              <a:rPr lang="fr-FR" dirty="0"/>
+              <a:t>JokiAutomation.exe "Pause" "</a:t>
+            </a:r>
+            <a:r>
+              <a:rPr lang="fr-FR" dirty="0" err="1"/>
+              <a:t>Text</a:t>
+            </a:r>
+            <a:r>
+              <a:rPr lang="fr-FR" dirty="0"/>
+              <a:t> 1" "</a:t>
+            </a:r>
+            <a:r>
+              <a:rPr lang="fr-FR" dirty="0" err="1"/>
+              <a:t>Text</a:t>
+            </a:r>
+            <a:r>
+              <a:rPr lang="fr-FR" dirty="0"/>
+              <a:t> 2"</a:t>
+            </a:r>
+            <a:endParaRPr lang="de-DE" dirty="0"/>
+          </a:p>
+        </p:txBody>
+      </p:sp>
+      <p:sp>
+        <p:nvSpPr>
+          <p:cNvPr id="4" name="Pfeil: nach rechts 3">
+            <a:hlinkClick r:id="rId2" action="ppaction://program"/>
+            <a:extLst>
+              <a:ext uri="{FF2B5EF4-FFF2-40B4-BE49-F238E27FC236}">
+                <a16:creationId xmlns:a16="http://schemas.microsoft.com/office/drawing/2014/main" id="{5D07DC50-91BF-4A42-B5AF-0D3DC4A229F5}"/>
+              </a:ext>
+            </a:extLst>
+          </p:cNvPr>
+          <p:cNvSpPr/>
+          <p:nvPr/>
+        </p:nvSpPr>
+        <p:spPr>
+          <a:xfrm>
+            <a:off x="5307724" y="3983420"/>
+            <a:ext cx="1492469" cy="693683"/>
+          </a:xfrm>
+          <a:prstGeom prst="rightArrow">
+            <a:avLst/>
+          </a:prstGeom>
+        </p:spPr>
+        <p:style>
+          <a:lnRef idx="2">
+            <a:schemeClr val="accent1">
+              <a:shade val="50000"/>
+            </a:schemeClr>
+          </a:lnRef>
+          <a:fillRef idx="1">
+            <a:schemeClr val="accent1"/>
+          </a:fillRef>
+          <a:effectRef idx="0">
+            <a:schemeClr val="accent1"/>
+          </a:effectRef>
+          <a:fontRef idx="minor">
+            <a:schemeClr val="lt1"/>
+          </a:fontRef>
+        </p:style>
+        <p:txBody>
+          <a:bodyPr rtlCol="0" anchor="ctr"/>
+          <a:lstStyle/>
+          <a:p>
+            <a:pPr algn="ctr"/>
+            <a:endParaRPr lang="de-DE" dirty="0"/>
+          </a:p>
+        </p:txBody>
+      </p:sp>
+    </p:spTree>
+    <p:extLst>
+      <p:ext uri="{BB962C8B-B14F-4D97-AF65-F5344CB8AC3E}">
+        <p14:creationId xmlns:p14="http://schemas.microsoft.com/office/powerpoint/2010/main" val="2321782577"/>
+      </p:ext>
+    </p:extLst>
+  </p:cSld>
+  <p:clrMapOvr>
+    <a:masterClrMapping/>
+  </p:clrMapOvr>
+</p:sld>
+</file>
+
+<file path=ppt/slides/slide20.xml><?xml version="1.0" encoding="utf-8"?>
+<p:sld xmlns:a="http://schemas.openxmlformats.org/drawingml/2006/main" xmlns:r="http://schemas.openxmlformats.org/officeDocument/2006/relationships" xmlns:p="http://schemas.openxmlformats.org/presentationml/2006/main">
+  <p:cSld>
+    <p:spTree>
+      <p:nvGrpSpPr>
+        <p:cNvPr id="1" name=""/>
+        <p:cNvGrpSpPr/>
+        <p:nvPr/>
+      </p:nvGrpSpPr>
+      <p:grpSpPr>
+        <a:xfrm>
+          <a:off x="0" y="0"/>
+          <a:ext cx="0" cy="0"/>
+          <a:chOff x="0" y="0"/>
+          <a:chExt cx="0" cy="0"/>
+        </a:xfrm>
+      </p:grpSpPr>
+      <p:sp>
+        <p:nvSpPr>
+          <p:cNvPr id="2" name="Titel 1">
+            <a:extLst>
+              <a:ext uri="{FF2B5EF4-FFF2-40B4-BE49-F238E27FC236}">
+                <a16:creationId xmlns:a16="http://schemas.microsoft.com/office/drawing/2014/main" id="{19DD5F15-9C27-4730-80B4-4B8CA5C3D954}"/>
+              </a:ext>
+            </a:extLst>
+          </p:cNvPr>
+          <p:cNvSpPr>
+            <a:spLocks noGrp="1"/>
+          </p:cNvSpPr>
+          <p:nvPr>
+            <p:ph type="title"/>
+          </p:nvPr>
+        </p:nvSpPr>
+        <p:spPr/>
+        <p:txBody>
+          <a:bodyPr/>
+          <a:lstStyle/>
+          <a:p>
+            <a:r>
+              <a:rPr lang="de-DE" dirty="0" err="1"/>
+              <a:t>shut</a:t>
+            </a:r>
+            <a:r>
+              <a:rPr lang="de-DE" dirty="0"/>
+              <a:t> down </a:t>
+            </a:r>
+            <a:r>
+              <a:rPr lang="de-DE" dirty="0" err="1"/>
+              <a:t>sequence</a:t>
+            </a:r>
+            <a:endParaRPr lang="de-DE" dirty="0"/>
+          </a:p>
+        </p:txBody>
+      </p:sp>
+      <p:sp>
+        <p:nvSpPr>
+          <p:cNvPr id="3" name="Inhaltsplatzhalter 2">
+            <a:extLst>
+              <a:ext uri="{FF2B5EF4-FFF2-40B4-BE49-F238E27FC236}">
+                <a16:creationId xmlns:a16="http://schemas.microsoft.com/office/drawing/2014/main" id="{E47621BA-2F32-4AB0-8C4C-5362CB4F4EC5}"/>
+              </a:ext>
+            </a:extLst>
+          </p:cNvPr>
+          <p:cNvSpPr>
+            <a:spLocks noGrp="1"/>
+          </p:cNvSpPr>
+          <p:nvPr>
+            <p:ph idx="1"/>
+          </p:nvPr>
+        </p:nvSpPr>
+        <p:spPr>
+          <a:xfrm>
+            <a:off x="838200" y="1807751"/>
+            <a:ext cx="10515600" cy="4351338"/>
+          </a:xfrm>
+        </p:spPr>
+        <p:txBody>
+          <a:bodyPr>
+            <a:normAutofit fontScale="92500" lnSpcReduction="10000"/>
+          </a:bodyPr>
+          <a:lstStyle/>
+          <a:p>
+            <a:r>
+              <a:rPr lang="de-DE" dirty="0" err="1"/>
+              <a:t>Stop</a:t>
+            </a:r>
+            <a:r>
+              <a:rPr lang="de-DE" dirty="0"/>
+              <a:t> Backup Recorder</a:t>
+            </a:r>
+          </a:p>
+          <a:p>
+            <a:r>
+              <a:rPr lang="de-DE" dirty="0"/>
+              <a:t>Switch off </a:t>
+            </a:r>
+            <a:r>
+              <a:rPr lang="de-DE" dirty="0" err="1"/>
+              <a:t>Beamer</a:t>
+            </a:r>
+            <a:r>
+              <a:rPr lang="de-DE" dirty="0"/>
+              <a:t> </a:t>
+            </a:r>
+          </a:p>
+          <a:p>
+            <a:r>
+              <a:rPr lang="de-DE" dirty="0"/>
+              <a:t>Switch off HDMI switch</a:t>
+            </a:r>
+          </a:p>
+          <a:p>
+            <a:r>
+              <a:rPr lang="de-DE" dirty="0"/>
+              <a:t>Switch off </a:t>
+            </a:r>
+            <a:r>
+              <a:rPr lang="de-DE" dirty="0" err="1"/>
+              <a:t>backup</a:t>
+            </a:r>
+            <a:r>
+              <a:rPr lang="de-DE" dirty="0"/>
+              <a:t> </a:t>
+            </a:r>
+            <a:r>
+              <a:rPr lang="de-DE" dirty="0" err="1"/>
+              <a:t>recorder</a:t>
+            </a:r>
+            <a:endParaRPr lang="de-DE" dirty="0"/>
+          </a:p>
+          <a:p>
+            <a:r>
+              <a:rPr lang="de-DE" dirty="0" err="1"/>
+              <a:t>Shut</a:t>
+            </a:r>
+            <a:r>
+              <a:rPr lang="de-DE" dirty="0"/>
+              <a:t> down </a:t>
+            </a:r>
+            <a:r>
+              <a:rPr lang="de-DE" dirty="0" err="1"/>
+              <a:t>raspberry</a:t>
+            </a:r>
+            <a:r>
+              <a:rPr lang="de-DE" dirty="0"/>
+              <a:t> </a:t>
+            </a:r>
+            <a:r>
+              <a:rPr lang="de-DE" dirty="0" err="1"/>
+              <a:t>pi</a:t>
+            </a:r>
+            <a:endParaRPr lang="de-DE" dirty="0"/>
+          </a:p>
+          <a:p>
+            <a:pPr marL="0" indent="0">
+              <a:buNone/>
+            </a:pPr>
+            <a:endParaRPr lang="de-DE" dirty="0"/>
+          </a:p>
+          <a:p>
+            <a:pPr marL="0" indent="0">
+              <a:buNone/>
+            </a:pPr>
+            <a:r>
+              <a:rPr lang="de-DE" sz="4300" b="1" dirty="0">
+                <a:solidFill>
+                  <a:srgbClr val="FF0000"/>
+                </a:solidFill>
+              </a:rPr>
+              <a:t>                                              Ausschaltsequenz!!!</a:t>
+            </a:r>
+            <a:endParaRPr lang="de-DE" sz="4300" b="1" dirty="0"/>
+          </a:p>
+          <a:p>
+            <a:pPr marL="0" indent="0">
+              <a:buNone/>
+            </a:pPr>
+            <a:endParaRPr lang="de-DE" dirty="0"/>
+          </a:p>
+          <a:p>
+            <a:pPr marL="0" indent="0">
+              <a:buNone/>
+            </a:pPr>
+            <a:r>
+              <a:rPr lang="fr-FR" dirty="0"/>
+              <a:t>JokiAutomation.exe  "</a:t>
+            </a:r>
+            <a:r>
+              <a:rPr lang="fr-FR" dirty="0" err="1"/>
+              <a:t>Ausschaltsequenz</a:t>
+            </a:r>
+            <a:r>
+              <a:rPr lang="fr-FR" dirty="0"/>
+              <a:t>"</a:t>
+            </a:r>
+            <a:endParaRPr lang="de-DE" dirty="0"/>
+          </a:p>
+        </p:txBody>
+      </p:sp>
+      <p:sp>
+        <p:nvSpPr>
+          <p:cNvPr id="4" name="Pfeil: nach rechts 3">
+            <a:hlinkClick r:id="rId2" action="ppaction://program"/>
+            <a:extLst>
+              <a:ext uri="{FF2B5EF4-FFF2-40B4-BE49-F238E27FC236}">
+                <a16:creationId xmlns:a16="http://schemas.microsoft.com/office/drawing/2014/main" id="{5D07DC50-91BF-4A42-B5AF-0D3DC4A229F5}"/>
+              </a:ext>
+            </a:extLst>
+          </p:cNvPr>
+          <p:cNvSpPr/>
+          <p:nvPr/>
+        </p:nvSpPr>
+        <p:spPr>
+          <a:xfrm>
+            <a:off x="5349765" y="3867807"/>
+            <a:ext cx="1492469" cy="693683"/>
+          </a:xfrm>
+          <a:prstGeom prst="rightArrow">
+            <a:avLst/>
+          </a:prstGeom>
+        </p:spPr>
+        <p:style>
+          <a:lnRef idx="2">
+            <a:schemeClr val="accent1">
+              <a:shade val="50000"/>
+            </a:schemeClr>
+          </a:lnRef>
+          <a:fillRef idx="1">
+            <a:schemeClr val="accent1"/>
+          </a:fillRef>
+          <a:effectRef idx="0">
+            <a:schemeClr val="accent1"/>
+          </a:effectRef>
+          <a:fontRef idx="minor">
+            <a:schemeClr val="lt1"/>
+          </a:fontRef>
+        </p:style>
+        <p:txBody>
+          <a:bodyPr rtlCol="0" anchor="ctr"/>
+          <a:lstStyle/>
+          <a:p>
+            <a:pPr marL="0" marR="0" lvl="0" indent="0" algn="ctr" defTabSz="457200" rtl="0" eaLnBrk="1" fontAlgn="auto" latinLnBrk="0" hangingPunct="1">
+              <a:lnSpc>
+                <a:spcPct val="100000"/>
+              </a:lnSpc>
+              <a:spcBef>
+                <a:spcPts val="0"/>
+              </a:spcBef>
+              <a:spcAft>
+                <a:spcPts val="0"/>
+              </a:spcAft>
+              <a:buClrTx/>
+              <a:buSzTx/>
+              <a:buFontTx/>
+              <a:buNone/>
+              <a:tabLst/>
+              <a:defRPr/>
+            </a:pPr>
+            <a:endParaRPr kumimoji="0" lang="de-DE" sz="1800" b="0" i="0" u="none" strike="noStrike" kern="1200" cap="none" spc="0" normalizeH="0" baseline="0" noProof="0" dirty="0">
+              <a:ln>
+                <a:noFill/>
+              </a:ln>
+              <a:solidFill>
+                <a:prstClr val="white"/>
+              </a:solidFill>
+              <a:effectLst/>
+              <a:uLnTx/>
+              <a:uFillTx/>
+              <a:latin typeface="Calibri"/>
+              <a:ea typeface="+mn-ea"/>
+              <a:cs typeface="+mn-cs"/>
+            </a:endParaRPr>
+          </a:p>
+        </p:txBody>
+      </p:sp>
+    </p:spTree>
+    <p:extLst>
+      <p:ext uri="{BB962C8B-B14F-4D97-AF65-F5344CB8AC3E}">
+        <p14:creationId xmlns:p14="http://schemas.microsoft.com/office/powerpoint/2010/main" val="3348951714"/>
+      </p:ext>
+    </p:extLst>
+  </p:cSld>
+  <p:clrMapOvr>
+    <a:masterClrMapping/>
+  </p:clrMapOvr>
+</p:sld>
+</file>
+
+<file path=ppt/slides/slide21.xml><?xml version="1.0" encoding="utf-8"?>
+<p:sld xmlns:a="http://schemas.openxmlformats.org/drawingml/2006/main" xmlns:r="http://schemas.openxmlformats.org/officeDocument/2006/relationships" xmlns:p="http://schemas.openxmlformats.org/presentationml/2006/main">
+  <p:cSld>
+    <p:spTree>
+      <p:nvGrpSpPr>
+        <p:cNvPr id="1" name=""/>
+        <p:cNvGrpSpPr/>
+        <p:nvPr/>
+      </p:nvGrpSpPr>
+      <p:grpSpPr>
+        <a:xfrm>
+          <a:off x="0" y="0"/>
+          <a:ext cx="0" cy="0"/>
+          <a:chOff x="0" y="0"/>
+          <a:chExt cx="0" cy="0"/>
+        </a:xfrm>
+      </p:grpSpPr>
+      <p:sp>
+        <p:nvSpPr>
+          <p:cNvPr id="2" name="Titel 1">
+            <a:extLst>
+              <a:ext uri="{FF2B5EF4-FFF2-40B4-BE49-F238E27FC236}">
+                <a16:creationId xmlns:a16="http://schemas.microsoft.com/office/drawing/2014/main" id="{19DD5F15-9C27-4730-80B4-4B8CA5C3D954}"/>
+              </a:ext>
+            </a:extLst>
+          </p:cNvPr>
+          <p:cNvSpPr>
+            <a:spLocks noGrp="1"/>
+          </p:cNvSpPr>
+          <p:nvPr>
+            <p:ph type="title"/>
+          </p:nvPr>
+        </p:nvSpPr>
+        <p:spPr/>
+        <p:txBody>
+          <a:bodyPr/>
+          <a:lstStyle/>
+          <a:p>
+            <a:r>
+              <a:rPr lang="de-DE" dirty="0"/>
+              <a:t>Position Control Camcorder Move </a:t>
+            </a:r>
+            <a:r>
+              <a:rPr lang="de-DE" dirty="0" err="1"/>
+              <a:t>Sequence</a:t>
+            </a:r>
+            <a:endParaRPr lang="de-DE" dirty="0"/>
+          </a:p>
+        </p:txBody>
+      </p:sp>
+      <p:sp>
+        <p:nvSpPr>
+          <p:cNvPr id="3" name="Inhaltsplatzhalter 2">
+            <a:extLst>
+              <a:ext uri="{FF2B5EF4-FFF2-40B4-BE49-F238E27FC236}">
+                <a16:creationId xmlns:a16="http://schemas.microsoft.com/office/drawing/2014/main" id="{E47621BA-2F32-4AB0-8C4C-5362CB4F4EC5}"/>
               </a:ext>
             </a:extLst>
           </p:cNvPr>
@@ -6989,7 +7790,7 @@
             <a:hlinkClick r:id="rId2" action="ppaction://program"/>
             <a:extLst>
               <a:ext uri="{FF2B5EF4-FFF2-40B4-BE49-F238E27FC236}">
-                <a16:creationId xmlns:a16="http://schemas.microsoft.com/office/drawing/2014/main" xmlns="" id="{5D07DC50-91BF-4A42-B5AF-0D3DC4A229F5}"/>
+                <a16:creationId xmlns:a16="http://schemas.microsoft.com/office/drawing/2014/main" id="{5D07DC50-91BF-4A42-B5AF-0D3DC4A229F5}"/>
               </a:ext>
             </a:extLst>
           </p:cNvPr>
@@ -7047,7 +7848,7 @@
             <a:hlinkClick r:id="rId3" action="ppaction://program"/>
             <a:extLst>
               <a:ext uri="{FF2B5EF4-FFF2-40B4-BE49-F238E27FC236}">
-                <a16:creationId xmlns:a16="http://schemas.microsoft.com/office/drawing/2014/main" xmlns="" id="{D2E203AA-DE16-4315-9C76-A7C180D58072}"/>
+                <a16:creationId xmlns:a16="http://schemas.microsoft.com/office/drawing/2014/main" id="{D2E203AA-DE16-4315-9C76-A7C180D58072}"/>
               </a:ext>
             </a:extLst>
           </p:cNvPr>
@@ -7174,7 +7975,7 @@
     </p:spTree>
     <p:extLst>
       <p:ext uri="{BB962C8B-B14F-4D97-AF65-F5344CB8AC3E}">
-        <p14:creationId xmlns:p14="http://schemas.microsoft.com/office/powerpoint/2010/main" xmlns="" val="1310994759"/>
+        <p14:creationId xmlns:p14="http://schemas.microsoft.com/office/powerpoint/2010/main" val="1310994759"/>
       </p:ext>
     </p:extLst>
   </p:cSld>
@@ -7184,7 +7985,7 @@
 </p:sld>
 </file>
 
-<file path=ppt/slides/slide2.xml><?xml version="1.0" encoding="utf-8"?>
+<file path=ppt/slides/slide22.xml><?xml version="1.0" encoding="utf-8"?>
 <p:sld xmlns:a="http://schemas.openxmlformats.org/drawingml/2006/main" xmlns:r="http://schemas.openxmlformats.org/officeDocument/2006/relationships" xmlns:p="http://schemas.openxmlformats.org/presentationml/2006/main">
   <p:cSld>
     <p:spTree>
@@ -7206,7 +8007,7 @@
           <p:cNvPr id="2" name="Titel 1">
             <a:extLst>
               <a:ext uri="{FF2B5EF4-FFF2-40B4-BE49-F238E27FC236}">
-                <a16:creationId xmlns:a16="http://schemas.microsoft.com/office/drawing/2014/main" xmlns="" id="{19DD5F15-9C27-4730-80B4-4B8CA5C3D954}"/>
+                <a16:creationId xmlns:a16="http://schemas.microsoft.com/office/drawing/2014/main" id="{19DD5F15-9C27-4730-80B4-4B8CA5C3D954}"/>
               </a:ext>
             </a:extLst>
           </p:cNvPr>
@@ -7223,13 +8024,14 @@
           <a:lstStyle/>
           <a:p>
             <a:r>
-              <a:rPr lang="de-DE" dirty="0" err="1"/>
-              <a:t>Eventtimer</a:t>
-            </a:r>
-            <a:r>
-              <a:rPr lang="de-DE" dirty="0"/>
-              <a:t> Pause Text 1  Text 2</a:t>
-            </a:r>
+              <a:rPr lang="de-DE" dirty="0"/>
+              <a:t>Position Control Camcorder Move </a:t>
+            </a:r>
+            <a:r>
+              <a:rPr lang="de-DE" dirty="0" err="1"/>
+              <a:t>Sequence</a:t>
+            </a:r>
+            <a:endParaRPr lang="de-DE" dirty="0"/>
           </a:p>
         </p:txBody>
       </p:sp>
@@ -7238,281 +8040,7 @@
           <p:cNvPr id="3" name="Inhaltsplatzhalter 2">
             <a:extLst>
               <a:ext uri="{FF2B5EF4-FFF2-40B4-BE49-F238E27FC236}">
-                <a16:creationId xmlns:a16="http://schemas.microsoft.com/office/drawing/2014/main" xmlns="" id="{E47621BA-2F32-4AB0-8C4C-5362CB4F4EC5}"/>
-              </a:ext>
-            </a:extLst>
-          </p:cNvPr>
-          <p:cNvSpPr>
-            <a:spLocks noGrp="1"/>
-          </p:cNvSpPr>
-          <p:nvPr>
-            <p:ph idx="1"/>
-          </p:nvPr>
-        </p:nvSpPr>
-        <p:spPr>
-          <a:xfrm>
-            <a:off x="838200" y="1807751"/>
-            <a:ext cx="10515600" cy="4351338"/>
-          </a:xfrm>
-        </p:spPr>
-        <p:txBody>
-          <a:bodyPr>
-            <a:normAutofit lnSpcReduction="10000"/>
-          </a:bodyPr>
-          <a:lstStyle/>
-          <a:p>
-            <a:r>
-              <a:rPr lang="de-DE" dirty="0" err="1"/>
-              <a:t>Beamer</a:t>
-            </a:r>
-            <a:r>
-              <a:rPr lang="de-DE" dirty="0"/>
-              <a:t> HDMI 1 (PPP </a:t>
-            </a:r>
-            <a:r>
-              <a:rPr lang="de-DE" dirty="0" err="1"/>
-              <a:t>view</a:t>
-            </a:r>
-            <a:r>
-              <a:rPr lang="de-DE" dirty="0"/>
-              <a:t>)</a:t>
-            </a:r>
-          </a:p>
-          <a:p>
-            <a:r>
-              <a:rPr lang="de-DE" dirty="0"/>
-              <a:t>Audio Mix </a:t>
-            </a:r>
-            <a:r>
-              <a:rPr lang="de-DE" dirty="0" err="1"/>
-              <a:t>Reset</a:t>
-            </a:r>
-            <a:r>
-              <a:rPr lang="de-DE" dirty="0"/>
-              <a:t> and </a:t>
-            </a:r>
-            <a:r>
-              <a:rPr lang="de-DE" dirty="0" err="1"/>
-              <a:t>then</a:t>
-            </a:r>
-            <a:r>
-              <a:rPr lang="de-DE" dirty="0"/>
-              <a:t> </a:t>
-            </a:r>
-            <a:r>
-              <a:rPr lang="de-DE" dirty="0" err="1"/>
-              <a:t>switched</a:t>
-            </a:r>
-            <a:r>
-              <a:rPr lang="de-DE" dirty="0"/>
-              <a:t> </a:t>
-            </a:r>
-            <a:r>
-              <a:rPr lang="de-DE" dirty="0" err="1"/>
-              <a:t>to</a:t>
-            </a:r>
-            <a:r>
-              <a:rPr lang="de-DE" dirty="0"/>
-              <a:t> Profile ‚Diashow‘</a:t>
-            </a:r>
-          </a:p>
-          <a:p>
-            <a:r>
-              <a:rPr lang="de-DE" dirty="0"/>
-              <a:t>HDMI Switch </a:t>
-            </a:r>
-            <a:r>
-              <a:rPr lang="de-DE" dirty="0" err="1"/>
-              <a:t>channel</a:t>
-            </a:r>
-            <a:r>
-              <a:rPr lang="de-DE" dirty="0"/>
-              <a:t> 1 (Laptop PPP)</a:t>
-            </a:r>
-          </a:p>
-          <a:p>
-            <a:r>
-              <a:rPr lang="de-DE" dirty="0" err="1"/>
-              <a:t>Slidershow</a:t>
-            </a:r>
-            <a:r>
-              <a:rPr lang="de-DE" dirty="0"/>
-              <a:t> + Pause, Text 1 and Text 2</a:t>
-            </a:r>
-          </a:p>
-          <a:p>
-            <a:endParaRPr lang="de-DE" dirty="0"/>
-          </a:p>
-          <a:p>
-            <a:pPr marL="0" indent="0">
-              <a:buNone/>
-            </a:pPr>
-            <a:r>
-              <a:rPr lang="de-DE" dirty="0"/>
-              <a:t>                                                                                </a:t>
-            </a:r>
-            <a:r>
-              <a:rPr lang="de-DE" dirty="0">
-                <a:solidFill>
-                  <a:srgbClr val="FF0000"/>
-                </a:solidFill>
-              </a:rPr>
-              <a:t>P</a:t>
-            </a:r>
-          </a:p>
-          <a:p>
-            <a:pPr marL="0" indent="0">
-              <a:buNone/>
-            </a:pPr>
-            <a:endParaRPr lang="de-DE" dirty="0"/>
-          </a:p>
-          <a:p>
-            <a:endParaRPr lang="de-DE" dirty="0"/>
-          </a:p>
-          <a:p>
-            <a:pPr marL="0" indent="0">
-              <a:buNone/>
-            </a:pPr>
-            <a:r>
-              <a:rPr lang="fr-FR" dirty="0"/>
-              <a:t>JokiAutomation.exe "Pause" "</a:t>
-            </a:r>
-            <a:r>
-              <a:rPr lang="fr-FR" dirty="0" err="1"/>
-              <a:t>Text</a:t>
-            </a:r>
-            <a:r>
-              <a:rPr lang="fr-FR" dirty="0"/>
-              <a:t> 1" "</a:t>
-            </a:r>
-            <a:r>
-              <a:rPr lang="fr-FR" dirty="0" err="1"/>
-              <a:t>Text</a:t>
-            </a:r>
-            <a:r>
-              <a:rPr lang="fr-FR" dirty="0"/>
-              <a:t> 2"</a:t>
-            </a:r>
-            <a:endParaRPr lang="de-DE" dirty="0"/>
-          </a:p>
-        </p:txBody>
-      </p:sp>
-      <p:sp>
-        <p:nvSpPr>
-          <p:cNvPr id="4" name="Pfeil: nach rechts 3">
-            <a:hlinkClick r:id="rId2" action="ppaction://program"/>
-            <a:extLst>
-              <a:ext uri="{FF2B5EF4-FFF2-40B4-BE49-F238E27FC236}">
-                <a16:creationId xmlns:a16="http://schemas.microsoft.com/office/drawing/2014/main" xmlns="" id="{5D07DC50-91BF-4A42-B5AF-0D3DC4A229F5}"/>
-              </a:ext>
-            </a:extLst>
-          </p:cNvPr>
-          <p:cNvSpPr/>
-          <p:nvPr/>
-        </p:nvSpPr>
-        <p:spPr>
-          <a:xfrm>
-            <a:off x="5307724" y="3983420"/>
-            <a:ext cx="1492469" cy="693683"/>
-          </a:xfrm>
-          <a:prstGeom prst="rightArrow">
-            <a:avLst/>
-          </a:prstGeom>
-        </p:spPr>
-        <p:style>
-          <a:lnRef idx="2">
-            <a:schemeClr val="accent1">
-              <a:shade val="50000"/>
-            </a:schemeClr>
-          </a:lnRef>
-          <a:fillRef idx="1">
-            <a:schemeClr val="accent1"/>
-          </a:fillRef>
-          <a:effectRef idx="0">
-            <a:schemeClr val="accent1"/>
-          </a:effectRef>
-          <a:fontRef idx="minor">
-            <a:schemeClr val="lt1"/>
-          </a:fontRef>
-        </p:style>
-        <p:txBody>
-          <a:bodyPr rtlCol="0" anchor="ctr"/>
-          <a:lstStyle/>
-          <a:p>
-            <a:pPr algn="ctr"/>
-            <a:endParaRPr lang="de-DE" dirty="0"/>
-          </a:p>
-        </p:txBody>
-      </p:sp>
-    </p:spTree>
-    <p:extLst>
-      <p:ext uri="{BB962C8B-B14F-4D97-AF65-F5344CB8AC3E}">
-        <p14:creationId xmlns:p14="http://schemas.microsoft.com/office/powerpoint/2010/main" xmlns="" val="2321782577"/>
-      </p:ext>
-    </p:extLst>
-  </p:cSld>
-  <p:clrMapOvr>
-    <a:masterClrMapping/>
-  </p:clrMapOvr>
-</p:sld>
-</file>
-
-<file path=ppt/slides/slide20.xml><?xml version="1.0" encoding="utf-8"?>
-<p:sld xmlns:a="http://schemas.openxmlformats.org/drawingml/2006/main" xmlns:r="http://schemas.openxmlformats.org/officeDocument/2006/relationships" xmlns:p="http://schemas.openxmlformats.org/presentationml/2006/main">
-  <p:cSld>
-    <p:spTree>
-      <p:nvGrpSpPr>
-        <p:cNvPr id="1" name=""/>
-        <p:cNvGrpSpPr/>
-        <p:nvPr/>
-      </p:nvGrpSpPr>
-      <p:grpSpPr>
-        <a:xfrm>
-          <a:off x="0" y="0"/>
-          <a:ext cx="0" cy="0"/>
-          <a:chOff x="0" y="0"/>
-          <a:chExt cx="0" cy="0"/>
-        </a:xfrm>
-      </p:grpSpPr>
-      <p:sp>
-        <p:nvSpPr>
-          <p:cNvPr id="2" name="Titel 1">
-            <a:extLst>
-              <a:ext uri="{FF2B5EF4-FFF2-40B4-BE49-F238E27FC236}">
-                <a16:creationId xmlns:a16="http://schemas.microsoft.com/office/drawing/2014/main" xmlns="" id="{19DD5F15-9C27-4730-80B4-4B8CA5C3D954}"/>
-              </a:ext>
-            </a:extLst>
-          </p:cNvPr>
-          <p:cNvSpPr>
-            <a:spLocks noGrp="1"/>
-          </p:cNvSpPr>
-          <p:nvPr>
-            <p:ph type="title"/>
-          </p:nvPr>
-        </p:nvSpPr>
-        <p:spPr/>
-        <p:txBody>
-          <a:bodyPr/>
-          <a:lstStyle/>
-          <a:p>
-            <a:r>
-              <a:rPr lang="de-DE" dirty="0"/>
-              <a:t>Position Control Camcorder Move </a:t>
-            </a:r>
-            <a:r>
-              <a:rPr lang="de-DE" dirty="0" err="1"/>
-              <a:t>Sequence</a:t>
-            </a:r>
-            <a:endParaRPr lang="de-DE" dirty="0"/>
-          </a:p>
-        </p:txBody>
-      </p:sp>
-      <p:sp>
-        <p:nvSpPr>
-          <p:cNvPr id="3" name="Inhaltsplatzhalter 2">
-            <a:extLst>
-              <a:ext uri="{FF2B5EF4-FFF2-40B4-BE49-F238E27FC236}">
-                <a16:creationId xmlns:a16="http://schemas.microsoft.com/office/drawing/2014/main" xmlns="" id="{E47621BA-2F32-4AB0-8C4C-5362CB4F4EC5}"/>
+                <a16:creationId xmlns:a16="http://schemas.microsoft.com/office/drawing/2014/main" id="{E47621BA-2F32-4AB0-8C4C-5362CB4F4EC5}"/>
               </a:ext>
             </a:extLst>
           </p:cNvPr>
@@ -8498,7 +9026,7 @@
               <a:t>appers</a:t>
             </a:r>
             <a:r>
-              <a:rPr lang="fr-FR" sz="2600" smtClean="0">
+              <a:rPr lang="fr-FR" sz="2600">
                 <a:solidFill>
                   <a:srgbClr val="FF0000"/>
                 </a:solidFill>
@@ -8691,7 +9219,7 @@
             <a:hlinkClick r:id="rId2" action="ppaction://program"/>
             <a:extLst>
               <a:ext uri="{FF2B5EF4-FFF2-40B4-BE49-F238E27FC236}">
-                <a16:creationId xmlns:a16="http://schemas.microsoft.com/office/drawing/2014/main" xmlns="" id="{5D07DC50-91BF-4A42-B5AF-0D3DC4A229F5}"/>
+                <a16:creationId xmlns:a16="http://schemas.microsoft.com/office/drawing/2014/main" id="{5D07DC50-91BF-4A42-B5AF-0D3DC4A229F5}"/>
               </a:ext>
             </a:extLst>
           </p:cNvPr>
@@ -8749,7 +9277,7 @@
             <a:hlinkClick r:id="rId3" action="ppaction://program"/>
             <a:extLst>
               <a:ext uri="{FF2B5EF4-FFF2-40B4-BE49-F238E27FC236}">
-                <a16:creationId xmlns:a16="http://schemas.microsoft.com/office/drawing/2014/main" xmlns="" id="{D2E203AA-DE16-4315-9C76-A7C180D58072}"/>
+                <a16:creationId xmlns:a16="http://schemas.microsoft.com/office/drawing/2014/main" id="{D2E203AA-DE16-4315-9C76-A7C180D58072}"/>
               </a:ext>
             </a:extLst>
           </p:cNvPr>
@@ -8876,7 +9404,7 @@
     </p:spTree>
     <p:extLst>
       <p:ext uri="{BB962C8B-B14F-4D97-AF65-F5344CB8AC3E}">
-        <p14:creationId xmlns:p14="http://schemas.microsoft.com/office/powerpoint/2010/main" xmlns="" val="386111599"/>
+        <p14:creationId xmlns:p14="http://schemas.microsoft.com/office/powerpoint/2010/main" val="386111599"/>
       </p:ext>
     </p:extLst>
   </p:cSld>
@@ -8886,7 +9414,7 @@
 </p:sld>
 </file>
 
-<file path=ppt/slides/slide21.xml><?xml version="1.0" encoding="utf-8"?>
+<file path=ppt/slides/slide23.xml><?xml version="1.0" encoding="utf-8"?>
 <p:sld xmlns:a="http://schemas.openxmlformats.org/drawingml/2006/main" xmlns:r="http://schemas.openxmlformats.org/officeDocument/2006/relationships" xmlns:p="http://schemas.openxmlformats.org/presentationml/2006/main">
   <p:cSld>
     <p:spTree>
@@ -8908,7 +9436,7 @@
           <p:cNvPr id="2" name="Titel 1">
             <a:extLst>
               <a:ext uri="{FF2B5EF4-FFF2-40B4-BE49-F238E27FC236}">
-                <a16:creationId xmlns:a16="http://schemas.microsoft.com/office/drawing/2014/main" xmlns="" id="{19DD5F15-9C27-4730-80B4-4B8CA5C3D954}"/>
+                <a16:creationId xmlns:a16="http://schemas.microsoft.com/office/drawing/2014/main" id="{19DD5F15-9C27-4730-80B4-4B8CA5C3D954}"/>
               </a:ext>
             </a:extLst>
           </p:cNvPr>
@@ -8941,7 +9469,7 @@
           <p:cNvPr id="3" name="Inhaltsplatzhalter 2">
             <a:extLst>
               <a:ext uri="{FF2B5EF4-FFF2-40B4-BE49-F238E27FC236}">
-                <a16:creationId xmlns:a16="http://schemas.microsoft.com/office/drawing/2014/main" xmlns="" id="{E47621BA-2F32-4AB0-8C4C-5362CB4F4EC5}"/>
+                <a16:creationId xmlns:a16="http://schemas.microsoft.com/office/drawing/2014/main" id="{E47621BA-2F32-4AB0-8C4C-5362CB4F4EC5}"/>
               </a:ext>
             </a:extLst>
           </p:cNvPr>
@@ -10120,7 +10648,7 @@
             <a:hlinkClick r:id="rId2" action="ppaction://program"/>
             <a:extLst>
               <a:ext uri="{FF2B5EF4-FFF2-40B4-BE49-F238E27FC236}">
-                <a16:creationId xmlns:a16="http://schemas.microsoft.com/office/drawing/2014/main" xmlns="" id="{5D07DC50-91BF-4A42-B5AF-0D3DC4A229F5}"/>
+                <a16:creationId xmlns:a16="http://schemas.microsoft.com/office/drawing/2014/main" id="{5D07DC50-91BF-4A42-B5AF-0D3DC4A229F5}"/>
               </a:ext>
             </a:extLst>
           </p:cNvPr>
@@ -10178,7 +10706,7 @@
             <a:hlinkClick r:id="rId3" action="ppaction://program"/>
             <a:extLst>
               <a:ext uri="{FF2B5EF4-FFF2-40B4-BE49-F238E27FC236}">
-                <a16:creationId xmlns:a16="http://schemas.microsoft.com/office/drawing/2014/main" xmlns="" id="{D2E203AA-DE16-4315-9C76-A7C180D58072}"/>
+                <a16:creationId xmlns:a16="http://schemas.microsoft.com/office/drawing/2014/main" id="{D2E203AA-DE16-4315-9C76-A7C180D58072}"/>
               </a:ext>
             </a:extLst>
           </p:cNvPr>
@@ -10305,7 +10833,7 @@
     </p:spTree>
     <p:extLst>
       <p:ext uri="{BB962C8B-B14F-4D97-AF65-F5344CB8AC3E}">
-        <p14:creationId xmlns:p14="http://schemas.microsoft.com/office/powerpoint/2010/main" xmlns="" val="1570476934"/>
+        <p14:creationId xmlns:p14="http://schemas.microsoft.com/office/powerpoint/2010/main" val="1570476934"/>
       </p:ext>
     </p:extLst>
   </p:cSld>
@@ -10337,7 +10865,7 @@
           <p:cNvPr id="2" name="Titel 1">
             <a:extLst>
               <a:ext uri="{FF2B5EF4-FFF2-40B4-BE49-F238E27FC236}">
-                <a16:creationId xmlns:a16="http://schemas.microsoft.com/office/drawing/2014/main" xmlns="" id="{19DD5F15-9C27-4730-80B4-4B8CA5C3D954}"/>
+                <a16:creationId xmlns:a16="http://schemas.microsoft.com/office/drawing/2014/main" id="{19DD5F15-9C27-4730-80B4-4B8CA5C3D954}"/>
               </a:ext>
             </a:extLst>
           </p:cNvPr>
@@ -10365,7 +10893,7 @@
           <p:cNvPr id="3" name="Inhaltsplatzhalter 2">
             <a:extLst>
               <a:ext uri="{FF2B5EF4-FFF2-40B4-BE49-F238E27FC236}">
-                <a16:creationId xmlns:a16="http://schemas.microsoft.com/office/drawing/2014/main" xmlns="" id="{E47621BA-2F32-4AB0-8C4C-5362CB4F4EC5}"/>
+                <a16:creationId xmlns:a16="http://schemas.microsoft.com/office/drawing/2014/main" id="{E47621BA-2F32-4AB0-8C4C-5362CB4F4EC5}"/>
               </a:ext>
             </a:extLst>
           </p:cNvPr>
@@ -10452,7 +10980,7 @@
             <a:hlinkClick r:id="rId2" action="ppaction://program"/>
             <a:extLst>
               <a:ext uri="{FF2B5EF4-FFF2-40B4-BE49-F238E27FC236}">
-                <a16:creationId xmlns:a16="http://schemas.microsoft.com/office/drawing/2014/main" xmlns="" id="{5D07DC50-91BF-4A42-B5AF-0D3DC4A229F5}"/>
+                <a16:creationId xmlns:a16="http://schemas.microsoft.com/office/drawing/2014/main" id="{5D07DC50-91BF-4A42-B5AF-0D3DC4A229F5}"/>
               </a:ext>
             </a:extLst>
           </p:cNvPr>
@@ -10496,7 +11024,7 @@
     </p:spTree>
     <p:extLst>
       <p:ext uri="{BB962C8B-B14F-4D97-AF65-F5344CB8AC3E}">
-        <p14:creationId xmlns:p14="http://schemas.microsoft.com/office/powerpoint/2010/main" xmlns="" val="2886927161"/>
+        <p14:creationId xmlns:p14="http://schemas.microsoft.com/office/powerpoint/2010/main" val="2886927161"/>
       </p:ext>
     </p:extLst>
   </p:cSld>
@@ -10528,7 +11056,7 @@
           <p:cNvPr id="2" name="Titel 1">
             <a:extLst>
               <a:ext uri="{FF2B5EF4-FFF2-40B4-BE49-F238E27FC236}">
-                <a16:creationId xmlns:a16="http://schemas.microsoft.com/office/drawing/2014/main" xmlns="" id="{19DD5F15-9C27-4730-80B4-4B8CA5C3D954}"/>
+                <a16:creationId xmlns:a16="http://schemas.microsoft.com/office/drawing/2014/main" id="{19DD5F15-9C27-4730-80B4-4B8CA5C3D954}"/>
               </a:ext>
             </a:extLst>
           </p:cNvPr>
@@ -10556,7 +11084,7 @@
           <p:cNvPr id="3" name="Inhaltsplatzhalter 2">
             <a:extLst>
               <a:ext uri="{FF2B5EF4-FFF2-40B4-BE49-F238E27FC236}">
-                <a16:creationId xmlns:a16="http://schemas.microsoft.com/office/drawing/2014/main" xmlns="" id="{E47621BA-2F32-4AB0-8C4C-5362CB4F4EC5}"/>
+                <a16:creationId xmlns:a16="http://schemas.microsoft.com/office/drawing/2014/main" id="{E47621BA-2F32-4AB0-8C4C-5362CB4F4EC5}"/>
               </a:ext>
             </a:extLst>
           </p:cNvPr>
@@ -10643,7 +11171,7 @@
             <a:hlinkClick r:id="rId2" action="ppaction://program"/>
             <a:extLst>
               <a:ext uri="{FF2B5EF4-FFF2-40B4-BE49-F238E27FC236}">
-                <a16:creationId xmlns:a16="http://schemas.microsoft.com/office/drawing/2014/main" xmlns="" id="{5D07DC50-91BF-4A42-B5AF-0D3DC4A229F5}"/>
+                <a16:creationId xmlns:a16="http://schemas.microsoft.com/office/drawing/2014/main" id="{5D07DC50-91BF-4A42-B5AF-0D3DC4A229F5}"/>
               </a:ext>
             </a:extLst>
           </p:cNvPr>
@@ -10687,7 +11215,7 @@
     </p:spTree>
     <p:extLst>
       <p:ext uri="{BB962C8B-B14F-4D97-AF65-F5344CB8AC3E}">
-        <p14:creationId xmlns:p14="http://schemas.microsoft.com/office/powerpoint/2010/main" xmlns="" val="2886927161"/>
+        <p14:creationId xmlns:p14="http://schemas.microsoft.com/office/powerpoint/2010/main" val="2886927161"/>
       </p:ext>
     </p:extLst>
   </p:cSld>
@@ -10719,7 +11247,7 @@
           <p:cNvPr id="2" name="Titel 1">
             <a:extLst>
               <a:ext uri="{FF2B5EF4-FFF2-40B4-BE49-F238E27FC236}">
-                <a16:creationId xmlns:a16="http://schemas.microsoft.com/office/drawing/2014/main" xmlns="" id="{19DD5F15-9C27-4730-80B4-4B8CA5C3D954}"/>
+                <a16:creationId xmlns:a16="http://schemas.microsoft.com/office/drawing/2014/main" id="{19DD5F15-9C27-4730-80B4-4B8CA5C3D954}"/>
               </a:ext>
             </a:extLst>
           </p:cNvPr>
@@ -10752,7 +11280,7 @@
           <p:cNvPr id="3" name="Inhaltsplatzhalter 2">
             <a:extLst>
               <a:ext uri="{FF2B5EF4-FFF2-40B4-BE49-F238E27FC236}">
-                <a16:creationId xmlns:a16="http://schemas.microsoft.com/office/drawing/2014/main" xmlns="" id="{E47621BA-2F32-4AB0-8C4C-5362CB4F4EC5}"/>
+                <a16:creationId xmlns:a16="http://schemas.microsoft.com/office/drawing/2014/main" id="{E47621BA-2F32-4AB0-8C4C-5362CB4F4EC5}"/>
               </a:ext>
             </a:extLst>
           </p:cNvPr>
@@ -10857,7 +11385,7 @@
             <a:hlinkClick r:id="rId2" action="ppaction://program"/>
             <a:extLst>
               <a:ext uri="{FF2B5EF4-FFF2-40B4-BE49-F238E27FC236}">
-                <a16:creationId xmlns:a16="http://schemas.microsoft.com/office/drawing/2014/main" xmlns="" id="{5D07DC50-91BF-4A42-B5AF-0D3DC4A229F5}"/>
+                <a16:creationId xmlns:a16="http://schemas.microsoft.com/office/drawing/2014/main" id="{5D07DC50-91BF-4A42-B5AF-0D3DC4A229F5}"/>
               </a:ext>
             </a:extLst>
           </p:cNvPr>
@@ -10901,7 +11429,7 @@
     </p:spTree>
     <p:extLst>
       <p:ext uri="{BB962C8B-B14F-4D97-AF65-F5344CB8AC3E}">
-        <p14:creationId xmlns:p14="http://schemas.microsoft.com/office/powerpoint/2010/main" xmlns="" val="2369076661"/>
+        <p14:creationId xmlns:p14="http://schemas.microsoft.com/office/powerpoint/2010/main" val="2369076661"/>
       </p:ext>
     </p:extLst>
   </p:cSld>
@@ -10933,7 +11461,7 @@
           <p:cNvPr id="2" name="Titel 1">
             <a:extLst>
               <a:ext uri="{FF2B5EF4-FFF2-40B4-BE49-F238E27FC236}">
-                <a16:creationId xmlns:a16="http://schemas.microsoft.com/office/drawing/2014/main" xmlns="" id="{19DD5F15-9C27-4730-80B4-4B8CA5C3D954}"/>
+                <a16:creationId xmlns:a16="http://schemas.microsoft.com/office/drawing/2014/main" id="{19DD5F15-9C27-4730-80B4-4B8CA5C3D954}"/>
               </a:ext>
             </a:extLst>
           </p:cNvPr>
@@ -10993,7 +11521,7 @@
           <p:cNvPr id="3" name="Inhaltsplatzhalter 2">
             <a:extLst>
               <a:ext uri="{FF2B5EF4-FFF2-40B4-BE49-F238E27FC236}">
-                <a16:creationId xmlns:a16="http://schemas.microsoft.com/office/drawing/2014/main" xmlns="" id="{E47621BA-2F32-4AB0-8C4C-5362CB4F4EC5}"/>
+                <a16:creationId xmlns:a16="http://schemas.microsoft.com/office/drawing/2014/main" id="{E47621BA-2F32-4AB0-8C4C-5362CB4F4EC5}"/>
               </a:ext>
             </a:extLst>
           </p:cNvPr>
@@ -11118,7 +11646,7 @@
             <a:hlinkClick r:id="rId2" action="ppaction://program"/>
             <a:extLst>
               <a:ext uri="{FF2B5EF4-FFF2-40B4-BE49-F238E27FC236}">
-                <a16:creationId xmlns:a16="http://schemas.microsoft.com/office/drawing/2014/main" xmlns="" id="{5D07DC50-91BF-4A42-B5AF-0D3DC4A229F5}"/>
+                <a16:creationId xmlns:a16="http://schemas.microsoft.com/office/drawing/2014/main" id="{5D07DC50-91BF-4A42-B5AF-0D3DC4A229F5}"/>
               </a:ext>
             </a:extLst>
           </p:cNvPr>
@@ -11162,7 +11690,7 @@
     </p:spTree>
     <p:extLst>
       <p:ext uri="{BB962C8B-B14F-4D97-AF65-F5344CB8AC3E}">
-        <p14:creationId xmlns:p14="http://schemas.microsoft.com/office/powerpoint/2010/main" xmlns="" val="864167983"/>
+        <p14:creationId xmlns:p14="http://schemas.microsoft.com/office/powerpoint/2010/main" val="864167983"/>
       </p:ext>
     </p:extLst>
   </p:cSld>
@@ -11194,7 +11722,7 @@
           <p:cNvPr id="2" name="Titel 1">
             <a:extLst>
               <a:ext uri="{FF2B5EF4-FFF2-40B4-BE49-F238E27FC236}">
-                <a16:creationId xmlns:a16="http://schemas.microsoft.com/office/drawing/2014/main" xmlns="" id="{19DD5F15-9C27-4730-80B4-4B8CA5C3D954}"/>
+                <a16:creationId xmlns:a16="http://schemas.microsoft.com/office/drawing/2014/main" id="{19DD5F15-9C27-4730-80B4-4B8CA5C3D954}"/>
               </a:ext>
             </a:extLst>
           </p:cNvPr>
@@ -11246,7 +11774,7 @@
           <p:cNvPr id="3" name="Inhaltsplatzhalter 2">
             <a:extLst>
               <a:ext uri="{FF2B5EF4-FFF2-40B4-BE49-F238E27FC236}">
-                <a16:creationId xmlns:a16="http://schemas.microsoft.com/office/drawing/2014/main" xmlns="" id="{E47621BA-2F32-4AB0-8C4C-5362CB4F4EC5}"/>
+                <a16:creationId xmlns:a16="http://schemas.microsoft.com/office/drawing/2014/main" id="{E47621BA-2F32-4AB0-8C4C-5362CB4F4EC5}"/>
               </a:ext>
             </a:extLst>
           </p:cNvPr>
@@ -11353,7 +11881,7 @@
             <a:hlinkClick r:id="rId2" action="ppaction://program"/>
             <a:extLst>
               <a:ext uri="{FF2B5EF4-FFF2-40B4-BE49-F238E27FC236}">
-                <a16:creationId xmlns:a16="http://schemas.microsoft.com/office/drawing/2014/main" xmlns="" id="{5D07DC50-91BF-4A42-B5AF-0D3DC4A229F5}"/>
+                <a16:creationId xmlns:a16="http://schemas.microsoft.com/office/drawing/2014/main" id="{5D07DC50-91BF-4A42-B5AF-0D3DC4A229F5}"/>
               </a:ext>
             </a:extLst>
           </p:cNvPr>
@@ -11397,7 +11925,7 @@
     </p:spTree>
     <p:extLst>
       <p:ext uri="{BB962C8B-B14F-4D97-AF65-F5344CB8AC3E}">
-        <p14:creationId xmlns:p14="http://schemas.microsoft.com/office/powerpoint/2010/main" xmlns="" val="2400966295"/>
+        <p14:creationId xmlns:p14="http://schemas.microsoft.com/office/powerpoint/2010/main" val="2400966295"/>
       </p:ext>
     </p:extLst>
   </p:cSld>
@@ -11429,7 +11957,7 @@
           <p:cNvPr id="2" name="Titel 1">
             <a:extLst>
               <a:ext uri="{FF2B5EF4-FFF2-40B4-BE49-F238E27FC236}">
-                <a16:creationId xmlns:a16="http://schemas.microsoft.com/office/drawing/2014/main" xmlns="" id="{19DD5F15-9C27-4730-80B4-4B8CA5C3D954}"/>
+                <a16:creationId xmlns:a16="http://schemas.microsoft.com/office/drawing/2014/main" id="{19DD5F15-9C27-4730-80B4-4B8CA5C3D954}"/>
               </a:ext>
             </a:extLst>
           </p:cNvPr>
@@ -11481,7 +12009,7 @@
           <p:cNvPr id="3" name="Inhaltsplatzhalter 2">
             <a:extLst>
               <a:ext uri="{FF2B5EF4-FFF2-40B4-BE49-F238E27FC236}">
-                <a16:creationId xmlns:a16="http://schemas.microsoft.com/office/drawing/2014/main" xmlns="" id="{E47621BA-2F32-4AB0-8C4C-5362CB4F4EC5}"/>
+                <a16:creationId xmlns:a16="http://schemas.microsoft.com/office/drawing/2014/main" id="{E47621BA-2F32-4AB0-8C4C-5362CB4F4EC5}"/>
               </a:ext>
             </a:extLst>
           </p:cNvPr>
@@ -11602,7 +12130,7 @@
             <a:hlinkClick r:id="rId2" action="ppaction://program"/>
             <a:extLst>
               <a:ext uri="{FF2B5EF4-FFF2-40B4-BE49-F238E27FC236}">
-                <a16:creationId xmlns:a16="http://schemas.microsoft.com/office/drawing/2014/main" xmlns="" id="{5D07DC50-91BF-4A42-B5AF-0D3DC4A229F5}"/>
+                <a16:creationId xmlns:a16="http://schemas.microsoft.com/office/drawing/2014/main" id="{5D07DC50-91BF-4A42-B5AF-0D3DC4A229F5}"/>
               </a:ext>
             </a:extLst>
           </p:cNvPr>
@@ -11646,7 +12174,7 @@
     </p:spTree>
     <p:extLst>
       <p:ext uri="{BB962C8B-B14F-4D97-AF65-F5344CB8AC3E}">
-        <p14:creationId xmlns:p14="http://schemas.microsoft.com/office/powerpoint/2010/main" xmlns="" val="2400966295"/>
+        <p14:creationId xmlns:p14="http://schemas.microsoft.com/office/powerpoint/2010/main" val="2400966295"/>
       </p:ext>
     </p:extLst>
   </p:cSld>
@@ -11678,7 +12206,7 @@
           <p:cNvPr id="2" name="Titel 1">
             <a:extLst>
               <a:ext uri="{FF2B5EF4-FFF2-40B4-BE49-F238E27FC236}">
-                <a16:creationId xmlns:a16="http://schemas.microsoft.com/office/drawing/2014/main" xmlns="" id="{19DD5F15-9C27-4730-80B4-4B8CA5C3D954}"/>
+                <a16:creationId xmlns:a16="http://schemas.microsoft.com/office/drawing/2014/main" id="{19DD5F15-9C27-4730-80B4-4B8CA5C3D954}"/>
               </a:ext>
             </a:extLst>
           </p:cNvPr>
@@ -11730,7 +12258,7 @@
           <p:cNvPr id="3" name="Inhaltsplatzhalter 2">
             <a:extLst>
               <a:ext uri="{FF2B5EF4-FFF2-40B4-BE49-F238E27FC236}">
-                <a16:creationId xmlns:a16="http://schemas.microsoft.com/office/drawing/2014/main" xmlns="" id="{E47621BA-2F32-4AB0-8C4C-5362CB4F4EC5}"/>
+                <a16:creationId xmlns:a16="http://schemas.microsoft.com/office/drawing/2014/main" id="{E47621BA-2F32-4AB0-8C4C-5362CB4F4EC5}"/>
               </a:ext>
             </a:extLst>
           </p:cNvPr>
@@ -11843,7 +12371,7 @@
             <a:hlinkClick r:id="rId2" action="ppaction://program"/>
             <a:extLst>
               <a:ext uri="{FF2B5EF4-FFF2-40B4-BE49-F238E27FC236}">
-                <a16:creationId xmlns:a16="http://schemas.microsoft.com/office/drawing/2014/main" xmlns="" id="{5D07DC50-91BF-4A42-B5AF-0D3DC4A229F5}"/>
+                <a16:creationId xmlns:a16="http://schemas.microsoft.com/office/drawing/2014/main" id="{5D07DC50-91BF-4A42-B5AF-0D3DC4A229F5}"/>
               </a:ext>
             </a:extLst>
           </p:cNvPr>
@@ -11887,7 +12415,7 @@
     </p:spTree>
     <p:extLst>
       <p:ext uri="{BB962C8B-B14F-4D97-AF65-F5344CB8AC3E}">
-        <p14:creationId xmlns:p14="http://schemas.microsoft.com/office/powerpoint/2010/main" xmlns="" val="2400966295"/>
+        <p14:creationId xmlns:p14="http://schemas.microsoft.com/office/powerpoint/2010/main" val="2400966295"/>
       </p:ext>
     </p:extLst>
   </p:cSld>
@@ -12152,7 +12680,7 @@
   <a:extraClrSchemeLst/>
   <a:extLst>
     <a:ext uri="{05A4C25C-085E-4340-85A3-A5531E510DB2}">
-      <thm15:themeFamily xmlns:thm15="http://schemas.microsoft.com/office/thememl/2012/main" xmlns="" name="Office Theme" id="{62F939B6-93AF-4DB8-9C6B-D6C7DFDC589F}" vid="{4F46216B-77A9-411A-B9D3-5023FCB70208}"/>
+      <thm15:themeFamily xmlns:thm15="http://schemas.microsoft.com/office/thememl/2012/main" name="Office Theme" id="{62F939B6-93AF-4DB8-9C6B-D6C7DFDC589F}" vid="{4F46216B-77A9-411A-B9D3-5023FCB70208}"/>
     </a:ext>
   </a:extLst>
 </a:theme>

</xml_diff>